<commit_message>
updated and finalized the slides ppt
</commit_message>
<xml_diff>
--- a/inst/r4proteomics_slides.pptx
+++ b/inst/r4proteomics_slides.pptx
@@ -13,9 +13,9 @@
     <p:sldId id="257" r:id="rId4"/>
     <p:sldId id="262" r:id="rId5"/>
     <p:sldId id="258" r:id="rId6"/>
-    <p:sldId id="259" r:id="rId7"/>
-    <p:sldId id="261" r:id="rId8"/>
-    <p:sldId id="260" r:id="rId9"/>
+    <p:sldId id="263" r:id="rId7"/>
+    <p:sldId id="264" r:id="rId8"/>
+    <p:sldId id="266" r:id="rId9"/>
   </p:sldIdLst>
   <p:sldSz cx="12192000" cy="6858000"/>
   <p:notesSz cx="6858000" cy="9144000"/>
@@ -120,11 +120,11 @@
         <p14:section name="Day 0" id="{1D16D1DA-ACAD-4E10-B283-AADBC3F5CDBD}">
           <p14:sldIdLst>
             <p14:sldId id="256"/>
+            <p14:sldId id="257"/>
           </p14:sldIdLst>
         </p14:section>
         <p14:section name="Day 1" id="{DDFC6817-248C-4506-BF7B-72F113843825}">
           <p14:sldIdLst>
-            <p14:sldId id="257"/>
             <p14:sldId id="262"/>
           </p14:sldIdLst>
         </p14:section>
@@ -135,17 +135,17 @@
         </p14:section>
         <p14:section name="Day 3" id="{DBDF1725-7FEC-4A1C-9869-445A2D466A1E}">
           <p14:sldIdLst>
-            <p14:sldId id="259"/>
+            <p14:sldId id="263"/>
           </p14:sldIdLst>
         </p14:section>
         <p14:section name="Day 4" id="{FCD4091A-B4AF-4ABB-B2D5-ACF1733E43E6}">
           <p14:sldIdLst>
-            <p14:sldId id="261"/>
+            <p14:sldId id="264"/>
           </p14:sldIdLst>
         </p14:section>
         <p14:section name="Day 5" id="{0AEBB606-CEA4-4116-A7BE-9F75C924F278}">
           <p14:sldIdLst>
-            <p14:sldId id="260"/>
+            <p14:sldId id="266"/>
           </p14:sldIdLst>
         </p14:section>
       </p14:sectionLst>
@@ -9165,7 +9165,7 @@
           <p:spPr>
             <a:xfrm>
               <a:off x="624078" y="270357"/>
-              <a:ext cx="5154930" cy="672235"/>
+              <a:ext cx="5154930" cy="465127"/>
             </a:xfrm>
             <a:prstGeom prst="rect">
               <a:avLst/>
@@ -9184,13 +9184,20 @@
                 </a:lnSpc>
               </a:pPr>
               <a:r>
-                <a:rPr lang="en-US" sz="2800" dirty="0">
+                <a:rPr lang="en-US" b="1" dirty="0">
                   <a:latin typeface="Fira Sans" panose="020B0503050000020004" pitchFamily="34" charset="0"/>
                   <a:hlinkClick r:id="rId2" action="ppaction://hlinkfile"/>
                 </a:rPr>
-                <a:t>Introduction to R and RStudio</a:t>
-              </a:r>
-              <a:endParaRPr lang="en-US" sz="4000" b="0" i="0" dirty="0">
+                <a:t>Introduction</a:t>
+              </a:r>
+              <a:r>
+                <a:rPr lang="en-US" dirty="0">
+                  <a:latin typeface="Fira Sans" panose="020B0503050000020004" pitchFamily="34" charset="0"/>
+                  <a:hlinkClick r:id="rId2" action="ppaction://hlinkfile"/>
+                </a:rPr>
+                <a:t> to R and RStudio</a:t>
+              </a:r>
+              <a:endParaRPr lang="en-US" sz="2800" b="0" i="0" dirty="0">
                 <a:solidFill>
                   <a:srgbClr val="1A292C"/>
                 </a:solidFill>
@@ -9455,6 +9462,471 @@
           <a:chExt cx="0" cy="0"/>
         </a:xfrm>
       </p:grpSpPr>
+      <p:grpSp>
+        <p:nvGrpSpPr>
+          <p:cNvPr id="4" name="Group 3">
+            <a:extLst>
+              <a:ext uri="{FF2B5EF4-FFF2-40B4-BE49-F238E27FC236}">
+                <a16:creationId xmlns:a16="http://schemas.microsoft.com/office/drawing/2014/main" id="{5BE1D3DC-971B-B0DF-DBB6-45FEE40D080A}"/>
+              </a:ext>
+            </a:extLst>
+          </p:cNvPr>
+          <p:cNvGrpSpPr/>
+          <p:nvPr/>
+        </p:nvGrpSpPr>
+        <p:grpSpPr>
+          <a:xfrm>
+            <a:off x="493777" y="270357"/>
+            <a:ext cx="5529072" cy="4426674"/>
+            <a:chOff x="624078" y="270357"/>
+            <a:chExt cx="5154930" cy="4426674"/>
+          </a:xfrm>
+        </p:grpSpPr>
+        <p:sp>
+          <p:nvSpPr>
+            <p:cNvPr id="5" name="TextBox 4">
+              <a:extLst>
+                <a:ext uri="{FF2B5EF4-FFF2-40B4-BE49-F238E27FC236}">
+                  <a16:creationId xmlns:a16="http://schemas.microsoft.com/office/drawing/2014/main" id="{9E41810A-413B-5C95-6A7F-334486213768}"/>
+                </a:ext>
+              </a:extLst>
+            </p:cNvPr>
+            <p:cNvSpPr txBox="1"/>
+            <p:nvPr/>
+          </p:nvSpPr>
+          <p:spPr>
+            <a:xfrm>
+              <a:off x="624078" y="1369582"/>
+              <a:ext cx="5154930" cy="3327449"/>
+            </a:xfrm>
+            <a:prstGeom prst="rect">
+              <a:avLst/>
+            </a:prstGeom>
+            <a:noFill/>
+          </p:spPr>
+          <p:txBody>
+            <a:bodyPr wrap="square">
+              <a:spAutoFit/>
+            </a:bodyPr>
+            <a:lstStyle/>
+            <a:p>
+              <a:pPr algn="l">
+                <a:lnSpc>
+                  <a:spcPct val="150000"/>
+                </a:lnSpc>
+                <a:buNone/>
+              </a:pPr>
+              <a:r>
+                <a:rPr lang="en-US" b="1" i="0" dirty="0">
+                  <a:solidFill>
+                    <a:srgbClr val="212529"/>
+                  </a:solidFill>
+                  <a:effectLst/>
+                  <a:latin typeface="Fira Sans" panose="020B0503050000020004" pitchFamily="34" charset="0"/>
+                </a:rPr>
+                <a:t>Learning Objectives:</a:t>
+              </a:r>
+            </a:p>
+            <a:p>
+              <a:pPr algn="l">
+                <a:lnSpc>
+                  <a:spcPct val="150000"/>
+                </a:lnSpc>
+                <a:buNone/>
+              </a:pPr>
+              <a:r>
+                <a:rPr lang="en-US" b="0" i="0" dirty="0">
+                  <a:solidFill>
+                    <a:srgbClr val="212529"/>
+                  </a:solidFill>
+                  <a:effectLst/>
+                  <a:latin typeface="Fira Sans" panose="020B0503050000020004" pitchFamily="34" charset="0"/>
+                </a:rPr>
+                <a:t>By the end of Day 2, you will be able to:</a:t>
+              </a:r>
+            </a:p>
+            <a:p>
+              <a:pPr marL="285750" indent="-285750">
+                <a:lnSpc>
+                  <a:spcPct val="150000"/>
+                </a:lnSpc>
+                <a:buFont typeface="Arial" panose="020B0604020202020204" pitchFamily="34" charset="0"/>
+                <a:buChar char="•"/>
+              </a:pPr>
+              <a:r>
+                <a:rPr lang="en-US" dirty="0">
+                  <a:latin typeface="Fira Sans" panose="020B0503050000020004" pitchFamily="34" charset="0"/>
+                </a:rPr>
+                <a:t>Module 1: Treat Proteomic Data</a:t>
+              </a:r>
+            </a:p>
+            <a:p>
+              <a:pPr marL="742950" lvl="1" indent="-285750">
+                <a:lnSpc>
+                  <a:spcPct val="150000"/>
+                </a:lnSpc>
+                <a:buFont typeface="Arial" panose="020B0604020202020204" pitchFamily="34" charset="0"/>
+                <a:buChar char="•"/>
+              </a:pPr>
+              <a:r>
+                <a:rPr lang="en-US" sz="1600" dirty="0">
+                  <a:latin typeface="Fira Sans" panose="020B0503050000020004" pitchFamily="34" charset="0"/>
+                </a:rPr>
+                <a:t>From Mass Spectrometry to Quantified Proteins</a:t>
+              </a:r>
+            </a:p>
+            <a:p>
+              <a:pPr marL="742950" lvl="1" indent="-285750">
+                <a:lnSpc>
+                  <a:spcPct val="150000"/>
+                </a:lnSpc>
+                <a:buFont typeface="Arial" panose="020B0604020202020204" pitchFamily="34" charset="0"/>
+                <a:buChar char="•"/>
+              </a:pPr>
+              <a:r>
+                <a:rPr lang="en-US" sz="1600" dirty="0">
+                  <a:latin typeface="Fira Sans" panose="020B0503050000020004" pitchFamily="34" charset="0"/>
+                </a:rPr>
+                <a:t>Structure of Proteomic Data Matrices</a:t>
+              </a:r>
+            </a:p>
+            <a:p>
+              <a:pPr marL="742950" lvl="1" indent="-285750">
+                <a:lnSpc>
+                  <a:spcPct val="150000"/>
+                </a:lnSpc>
+                <a:buFont typeface="Arial" panose="020B0604020202020204" pitchFamily="34" charset="0"/>
+                <a:buChar char="•"/>
+              </a:pPr>
+              <a:r>
+                <a:rPr lang="en-GB" sz="1600" dirty="0">
+                  <a:latin typeface="Fira Sans" panose="020B0503050000020004" pitchFamily="34" charset="0"/>
+                </a:rPr>
+                <a:t>Understanding Your Data</a:t>
+              </a:r>
+            </a:p>
+            <a:p>
+              <a:pPr marL="285750" indent="-285750">
+                <a:lnSpc>
+                  <a:spcPct val="150000"/>
+                </a:lnSpc>
+                <a:buFont typeface="Arial" panose="020B0604020202020204" pitchFamily="34" charset="0"/>
+                <a:buChar char="•"/>
+              </a:pPr>
+              <a:r>
+                <a:rPr lang="en-US" dirty="0">
+                  <a:latin typeface="Fira Sans" panose="020B0503050000020004" pitchFamily="34" charset="0"/>
+                </a:rPr>
+                <a:t>Module 2: Initial Quality Control</a:t>
+              </a:r>
+            </a:p>
+            <a:p>
+              <a:pPr marL="285750" indent="-285750">
+                <a:lnSpc>
+                  <a:spcPct val="150000"/>
+                </a:lnSpc>
+                <a:buFont typeface="Arial" panose="020B0604020202020204" pitchFamily="34" charset="0"/>
+                <a:buChar char="•"/>
+              </a:pPr>
+              <a:r>
+                <a:rPr lang="en-US" dirty="0">
+                  <a:latin typeface="Fira Sans" panose="020B0503050000020004" pitchFamily="34" charset="0"/>
+                </a:rPr>
+                <a:t>Module 3: Exploratory Data Analysis (EDA)</a:t>
+              </a:r>
+            </a:p>
+          </p:txBody>
+        </p:sp>
+        <p:sp>
+          <p:nvSpPr>
+            <p:cNvPr id="6" name="TextBox 5">
+              <a:extLst>
+                <a:ext uri="{FF2B5EF4-FFF2-40B4-BE49-F238E27FC236}">
+                  <a16:creationId xmlns:a16="http://schemas.microsoft.com/office/drawing/2014/main" id="{3EBB60C9-97D8-D5BB-9F1B-78D33A52D8AF}"/>
+                </a:ext>
+              </a:extLst>
+            </p:cNvPr>
+            <p:cNvSpPr txBox="1"/>
+            <p:nvPr/>
+          </p:nvSpPr>
+          <p:spPr>
+            <a:xfrm>
+              <a:off x="624078" y="270357"/>
+              <a:ext cx="5154930" cy="465127"/>
+            </a:xfrm>
+            <a:prstGeom prst="rect">
+              <a:avLst/>
+            </a:prstGeom>
+            <a:noFill/>
+          </p:spPr>
+          <p:txBody>
+            <a:bodyPr wrap="square">
+              <a:spAutoFit/>
+            </a:bodyPr>
+            <a:lstStyle/>
+            <a:p>
+              <a:pPr>
+                <a:lnSpc>
+                  <a:spcPct val="150000"/>
+                </a:lnSpc>
+              </a:pPr>
+              <a:r>
+                <a:rPr lang="en-US" b="1" u="sng" dirty="0">
+                  <a:latin typeface="Fira Sans" panose="020B0503050000020004" pitchFamily="34" charset="0"/>
+                  <a:hlinkClick r:id="rId2" action="ppaction://hlinkfile"/>
+                </a:rPr>
+                <a:t>Introduction to Proteomic Data &amp; Quality Control</a:t>
+              </a:r>
+              <a:endParaRPr lang="en-US" sz="4000" b="0" i="0" dirty="0">
+                <a:solidFill>
+                  <a:srgbClr val="1A292C"/>
+                </a:solidFill>
+                <a:effectLst/>
+                <a:latin typeface="Fira Sans" panose="020B0503050000020004" pitchFamily="34" charset="0"/>
+              </a:endParaRPr>
+            </a:p>
+          </p:txBody>
+        </p:sp>
+      </p:grpSp>
+      <p:grpSp>
+        <p:nvGrpSpPr>
+          <p:cNvPr id="7" name="Group 6">
+            <a:extLst>
+              <a:ext uri="{FF2B5EF4-FFF2-40B4-BE49-F238E27FC236}">
+                <a16:creationId xmlns:a16="http://schemas.microsoft.com/office/drawing/2014/main" id="{8F352149-06AE-19E8-6A8C-8577B9412E81}"/>
+              </a:ext>
+            </a:extLst>
+          </p:cNvPr>
+          <p:cNvGrpSpPr/>
+          <p:nvPr/>
+        </p:nvGrpSpPr>
+        <p:grpSpPr>
+          <a:xfrm>
+            <a:off x="6169152" y="270357"/>
+            <a:ext cx="5946648" cy="4886416"/>
+            <a:chOff x="624078" y="270357"/>
+            <a:chExt cx="5869258" cy="4886416"/>
+          </a:xfrm>
+        </p:grpSpPr>
+        <p:sp>
+          <p:nvSpPr>
+            <p:cNvPr id="8" name="TextBox 7">
+              <a:extLst>
+                <a:ext uri="{FF2B5EF4-FFF2-40B4-BE49-F238E27FC236}">
+                  <a16:creationId xmlns:a16="http://schemas.microsoft.com/office/drawing/2014/main" id="{46DFDA27-2473-25EF-0AD6-F620E47A52CC}"/>
+                </a:ext>
+              </a:extLst>
+            </p:cNvPr>
+            <p:cNvSpPr txBox="1"/>
+            <p:nvPr/>
+          </p:nvSpPr>
+          <p:spPr>
+            <a:xfrm>
+              <a:off x="624078" y="1369582"/>
+              <a:ext cx="5869258" cy="3787191"/>
+            </a:xfrm>
+            <a:prstGeom prst="rect">
+              <a:avLst/>
+            </a:prstGeom>
+            <a:noFill/>
+          </p:spPr>
+          <p:txBody>
+            <a:bodyPr wrap="square">
+              <a:spAutoFit/>
+            </a:bodyPr>
+            <a:lstStyle/>
+            <a:p>
+              <a:pPr>
+                <a:lnSpc>
+                  <a:spcPct val="150000"/>
+                </a:lnSpc>
+              </a:pPr>
+              <a:r>
+                <a:rPr lang="en-GB" dirty="0">
+                  <a:latin typeface="Fira Sans" panose="020B0503050000020004" pitchFamily="34" charset="0"/>
+                </a:rPr>
+                <a:t>Today you learned:</a:t>
+              </a:r>
+            </a:p>
+            <a:p>
+              <a:pPr marL="285750" indent="-285750">
+                <a:lnSpc>
+                  <a:spcPct val="150000"/>
+                </a:lnSpc>
+                <a:buFont typeface="Arial" panose="020B0604020202020204" pitchFamily="34" charset="0"/>
+                <a:buChar char="•"/>
+              </a:pPr>
+              <a:r>
+                <a:rPr lang="en-GB" dirty="0">
+                  <a:latin typeface="Fira Sans" panose="020B0503050000020004" pitchFamily="34" charset="0"/>
+                </a:rPr>
+                <a:t>✓ Structure of proteomic data matrices</a:t>
+              </a:r>
+            </a:p>
+            <a:p>
+              <a:pPr marL="285750" indent="-285750">
+                <a:lnSpc>
+                  <a:spcPct val="150000"/>
+                </a:lnSpc>
+                <a:buFont typeface="Arial" panose="020B0604020202020204" pitchFamily="34" charset="0"/>
+                <a:buChar char="•"/>
+              </a:pPr>
+              <a:r>
+                <a:rPr lang="en-GB" dirty="0">
+                  <a:latin typeface="Fira Sans" panose="020B0503050000020004" pitchFamily="34" charset="0"/>
+                </a:rPr>
+                <a:t>✓ Common data quality issues (</a:t>
+              </a:r>
+              <a:r>
+                <a:rPr lang="en-GB" b="1" dirty="0">
+                  <a:latin typeface="Fira Sans" panose="020B0503050000020004" pitchFamily="34" charset="0"/>
+                </a:rPr>
+                <a:t>missing values, outliers, batch effects</a:t>
+              </a:r>
+              <a:r>
+                <a:rPr lang="en-GB" dirty="0">
+                  <a:latin typeface="Fira Sans" panose="020B0503050000020004" pitchFamily="34" charset="0"/>
+                </a:rPr>
+                <a:t>)</a:t>
+              </a:r>
+            </a:p>
+            <a:p>
+              <a:pPr marL="285750" indent="-285750">
+                <a:lnSpc>
+                  <a:spcPct val="150000"/>
+                </a:lnSpc>
+                <a:buFont typeface="Arial" panose="020B0604020202020204" pitchFamily="34" charset="0"/>
+                <a:buChar char="•"/>
+              </a:pPr>
+              <a:r>
+                <a:rPr lang="en-GB" dirty="0">
+                  <a:latin typeface="Fira Sans" panose="020B0503050000020004" pitchFamily="34" charset="0"/>
+                </a:rPr>
+                <a:t>✓ Quality control </a:t>
+              </a:r>
+              <a:r>
+                <a:rPr lang="en-GB" b="1" dirty="0">
+                  <a:latin typeface="Fira Sans" panose="020B0503050000020004" pitchFamily="34" charset="0"/>
+                </a:rPr>
+                <a:t>visualization</a:t>
+              </a:r>
+              <a:r>
+                <a:rPr lang="en-GB" dirty="0">
+                  <a:latin typeface="Fira Sans" panose="020B0503050000020004" pitchFamily="34" charset="0"/>
+                </a:rPr>
+                <a:t> techniques (</a:t>
+              </a:r>
+              <a:r>
+                <a:rPr lang="en-US" dirty="0">
+                  <a:solidFill>
+                    <a:srgbClr val="212529"/>
+                  </a:solidFill>
+                  <a:latin typeface="Fira Sans" panose="020B0503050000020004" pitchFamily="34" charset="0"/>
+                </a:rPr>
+                <a:t>PCA, boxplots, and heatmaps)</a:t>
+              </a:r>
+            </a:p>
+            <a:p>
+              <a:pPr marL="285750" indent="-285750">
+                <a:lnSpc>
+                  <a:spcPct val="150000"/>
+                </a:lnSpc>
+                <a:buFont typeface="Arial" panose="020B0604020202020204" pitchFamily="34" charset="0"/>
+                <a:buChar char="•"/>
+              </a:pPr>
+              <a:r>
+                <a:rPr lang="en-US" dirty="0">
+                  <a:solidFill>
+                    <a:srgbClr val="212529"/>
+                  </a:solidFill>
+                  <a:latin typeface="Fira Sans" panose="020B0503050000020004" pitchFamily="34" charset="0"/>
+                </a:rPr>
+                <a:t>Conduct exploratory data analysis (EDA)</a:t>
+              </a:r>
+              <a:endParaRPr lang="en-GB" dirty="0">
+                <a:latin typeface="Fira Sans" panose="020B0503050000020004" pitchFamily="34" charset="0"/>
+              </a:endParaRPr>
+            </a:p>
+            <a:p>
+              <a:pPr marL="285750" indent="-285750">
+                <a:lnSpc>
+                  <a:spcPct val="150000"/>
+                </a:lnSpc>
+                <a:buFont typeface="Arial" panose="020B0604020202020204" pitchFamily="34" charset="0"/>
+                <a:buChar char="•"/>
+              </a:pPr>
+              <a:r>
+                <a:rPr lang="en-GB" dirty="0">
+                  <a:latin typeface="Fira Sans" panose="020B0503050000020004" pitchFamily="34" charset="0"/>
+                </a:rPr>
+                <a:t>✓ Exploratory data analysis methods</a:t>
+              </a:r>
+            </a:p>
+            <a:p>
+              <a:pPr marL="285750" indent="-285750">
+                <a:lnSpc>
+                  <a:spcPct val="150000"/>
+                </a:lnSpc>
+                <a:buFont typeface="Arial" panose="020B0604020202020204" pitchFamily="34" charset="0"/>
+                <a:buChar char="•"/>
+              </a:pPr>
+              <a:r>
+                <a:rPr lang="en-GB" dirty="0">
+                  <a:latin typeface="Fira Sans" panose="020B0503050000020004" pitchFamily="34" charset="0"/>
+                </a:rPr>
+                <a:t>✓ Sample correlation and clustering</a:t>
+              </a:r>
+            </a:p>
+          </p:txBody>
+        </p:sp>
+        <p:sp>
+          <p:nvSpPr>
+            <p:cNvPr id="9" name="TextBox 8">
+              <a:extLst>
+                <a:ext uri="{FF2B5EF4-FFF2-40B4-BE49-F238E27FC236}">
+                  <a16:creationId xmlns:a16="http://schemas.microsoft.com/office/drawing/2014/main" id="{C2F47AD5-8550-4A89-A148-B2E533BED619}"/>
+                </a:ext>
+              </a:extLst>
+            </p:cNvPr>
+            <p:cNvSpPr txBox="1"/>
+            <p:nvPr/>
+          </p:nvSpPr>
+          <p:spPr>
+            <a:xfrm>
+              <a:off x="624078" y="270357"/>
+              <a:ext cx="5154930" cy="672235"/>
+            </a:xfrm>
+            <a:prstGeom prst="rect">
+              <a:avLst/>
+            </a:prstGeom>
+            <a:noFill/>
+          </p:spPr>
+          <p:txBody>
+            <a:bodyPr wrap="square">
+              <a:spAutoFit/>
+            </a:bodyPr>
+            <a:lstStyle/>
+            <a:p>
+              <a:pPr algn="l">
+                <a:lnSpc>
+                  <a:spcPct val="150000"/>
+                </a:lnSpc>
+                <a:buNone/>
+              </a:pPr>
+              <a:r>
+                <a:rPr lang="en-US" sz="2800" b="0" i="0" dirty="0">
+                  <a:solidFill>
+                    <a:srgbClr val="1A292C"/>
+                  </a:solidFill>
+                  <a:effectLst/>
+                  <a:latin typeface="Fira Sans" panose="020B0503050000020004" pitchFamily="34" charset="0"/>
+                </a:rPr>
+                <a:t>Day 2 Summary</a:t>
+              </a:r>
+            </a:p>
+          </p:txBody>
+        </p:sp>
+      </p:grpSp>
     </p:spTree>
     <p:extLst>
       <p:ext uri="{BB962C8B-B14F-4D97-AF65-F5344CB8AC3E}">
@@ -9473,7 +9945,13 @@
   <p:cSld>
     <p:spTree>
       <p:nvGrpSpPr>
-        <p:cNvPr id="1" name=""/>
+        <p:cNvPr id="1" name="">
+          <a:extLst>
+            <a:ext uri="{FF2B5EF4-FFF2-40B4-BE49-F238E27FC236}">
+              <a16:creationId xmlns:a16="http://schemas.microsoft.com/office/drawing/2014/main" id="{AC0EF8CE-D733-4D7D-285E-20951FEEB015}"/>
+            </a:ext>
+          </a:extLst>
+        </p:cNvPr>
         <p:cNvGrpSpPr/>
         <p:nvPr/>
       </p:nvGrpSpPr>
@@ -9485,10 +9963,461 @@
           <a:chExt cx="0" cy="0"/>
         </a:xfrm>
       </p:grpSpPr>
+      <p:grpSp>
+        <p:nvGrpSpPr>
+          <p:cNvPr id="4" name="Group 3">
+            <a:extLst>
+              <a:ext uri="{FF2B5EF4-FFF2-40B4-BE49-F238E27FC236}">
+                <a16:creationId xmlns:a16="http://schemas.microsoft.com/office/drawing/2014/main" id="{D7368535-A238-3DDB-D876-E02FD3651AE2}"/>
+              </a:ext>
+            </a:extLst>
+          </p:cNvPr>
+          <p:cNvGrpSpPr/>
+          <p:nvPr/>
+        </p:nvGrpSpPr>
+        <p:grpSpPr>
+          <a:xfrm>
+            <a:off x="493777" y="270357"/>
+            <a:ext cx="5529072" cy="3229103"/>
+            <a:chOff x="624078" y="270357"/>
+            <a:chExt cx="5154930" cy="3229103"/>
+          </a:xfrm>
+        </p:grpSpPr>
+        <p:sp>
+          <p:nvSpPr>
+            <p:cNvPr id="5" name="TextBox 4">
+              <a:extLst>
+                <a:ext uri="{FF2B5EF4-FFF2-40B4-BE49-F238E27FC236}">
+                  <a16:creationId xmlns:a16="http://schemas.microsoft.com/office/drawing/2014/main" id="{4315CE10-0707-081B-4479-B1A2A38C4D8E}"/>
+                </a:ext>
+              </a:extLst>
+            </p:cNvPr>
+            <p:cNvSpPr txBox="1"/>
+            <p:nvPr/>
+          </p:nvSpPr>
+          <p:spPr>
+            <a:xfrm>
+              <a:off x="624078" y="1369582"/>
+              <a:ext cx="5154930" cy="2129878"/>
+            </a:xfrm>
+            <a:prstGeom prst="rect">
+              <a:avLst/>
+            </a:prstGeom>
+            <a:noFill/>
+          </p:spPr>
+          <p:txBody>
+            <a:bodyPr wrap="square">
+              <a:spAutoFit/>
+            </a:bodyPr>
+            <a:lstStyle/>
+            <a:p>
+              <a:pPr algn="l">
+                <a:lnSpc>
+                  <a:spcPct val="150000"/>
+                </a:lnSpc>
+                <a:buNone/>
+              </a:pPr>
+              <a:r>
+                <a:rPr lang="en-US" b="1" i="0" dirty="0">
+                  <a:solidFill>
+                    <a:srgbClr val="212529"/>
+                  </a:solidFill>
+                  <a:effectLst/>
+                  <a:latin typeface="Fira Sans" panose="020B0503050000020004" pitchFamily="34" charset="0"/>
+                </a:rPr>
+                <a:t>Learning Objectives:</a:t>
+              </a:r>
+            </a:p>
+            <a:p>
+              <a:pPr algn="l">
+                <a:lnSpc>
+                  <a:spcPct val="150000"/>
+                </a:lnSpc>
+                <a:buNone/>
+              </a:pPr>
+              <a:r>
+                <a:rPr lang="en-US" b="0" i="0" dirty="0">
+                  <a:solidFill>
+                    <a:srgbClr val="212529"/>
+                  </a:solidFill>
+                  <a:effectLst/>
+                  <a:latin typeface="Fira Sans" panose="020B0503050000020004" pitchFamily="34" charset="0"/>
+                </a:rPr>
+                <a:t>By the end of Day 3, you will be able to perform:</a:t>
+              </a:r>
+            </a:p>
+            <a:p>
+              <a:pPr marL="285750" indent="-285750">
+                <a:lnSpc>
+                  <a:spcPct val="150000"/>
+                </a:lnSpc>
+                <a:buFont typeface="Arial" panose="020B0604020202020204" pitchFamily="34" charset="0"/>
+                <a:buChar char="•"/>
+              </a:pPr>
+              <a:r>
+                <a:rPr lang="en-GB" dirty="0">
+                  <a:latin typeface="Fira Sans" panose="020B0503050000020004" pitchFamily="34" charset="0"/>
+                </a:rPr>
+                <a:t>Module 1: Data Preprocessing</a:t>
+              </a:r>
+            </a:p>
+            <a:p>
+              <a:pPr marL="285750" indent="-285750">
+                <a:lnSpc>
+                  <a:spcPct val="150000"/>
+                </a:lnSpc>
+                <a:buFont typeface="Arial" panose="020B0604020202020204" pitchFamily="34" charset="0"/>
+                <a:buChar char="•"/>
+              </a:pPr>
+              <a:r>
+                <a:rPr lang="en-GB" dirty="0">
+                  <a:latin typeface="Fira Sans" panose="020B0503050000020004" pitchFamily="34" charset="0"/>
+                </a:rPr>
+                <a:t>Module 2: Batch Effect Correction</a:t>
+              </a:r>
+            </a:p>
+            <a:p>
+              <a:pPr marL="285750" indent="-285750">
+                <a:lnSpc>
+                  <a:spcPct val="150000"/>
+                </a:lnSpc>
+                <a:buFont typeface="Arial" panose="020B0604020202020204" pitchFamily="34" charset="0"/>
+                <a:buChar char="•"/>
+              </a:pPr>
+              <a:r>
+                <a:rPr lang="en-GB" dirty="0">
+                  <a:latin typeface="Fira Sans" panose="020B0503050000020004" pitchFamily="34" charset="0"/>
+                </a:rPr>
+                <a:t>Module 3: Differential Expression Analysis</a:t>
+              </a:r>
+            </a:p>
+          </p:txBody>
+        </p:sp>
+        <p:sp>
+          <p:nvSpPr>
+            <p:cNvPr id="6" name="TextBox 5">
+              <a:extLst>
+                <a:ext uri="{FF2B5EF4-FFF2-40B4-BE49-F238E27FC236}">
+                  <a16:creationId xmlns:a16="http://schemas.microsoft.com/office/drawing/2014/main" id="{E3EF09D1-D6C3-5A0A-3C90-15D8172E0C84}"/>
+                </a:ext>
+              </a:extLst>
+            </p:cNvPr>
+            <p:cNvSpPr txBox="1"/>
+            <p:nvPr/>
+          </p:nvSpPr>
+          <p:spPr>
+            <a:xfrm>
+              <a:off x="624078" y="270357"/>
+              <a:ext cx="5154930" cy="465064"/>
+            </a:xfrm>
+            <a:prstGeom prst="rect">
+              <a:avLst/>
+            </a:prstGeom>
+            <a:noFill/>
+          </p:spPr>
+          <p:txBody>
+            <a:bodyPr wrap="square">
+              <a:spAutoFit/>
+            </a:bodyPr>
+            <a:lstStyle/>
+            <a:p>
+              <a:pPr>
+                <a:lnSpc>
+                  <a:spcPct val="150000"/>
+                </a:lnSpc>
+              </a:pPr>
+              <a:r>
+                <a:rPr lang="en-GB" b="1" u="sng" dirty="0">
+                  <a:latin typeface="Fira Sans" panose="020B0503050000020004" pitchFamily="34" charset="0"/>
+                  <a:hlinkClick r:id="rId2" action="ppaction://hlinkfile"/>
+                </a:rPr>
+                <a:t>Preprocessing and Differential Expression</a:t>
+              </a:r>
+              <a:endParaRPr lang="en-US" sz="4400" b="0" i="0" dirty="0">
+                <a:solidFill>
+                  <a:srgbClr val="1A292C"/>
+                </a:solidFill>
+                <a:effectLst/>
+                <a:latin typeface="Fira Sans" panose="020B0503050000020004" pitchFamily="34" charset="0"/>
+              </a:endParaRPr>
+            </a:p>
+          </p:txBody>
+        </p:sp>
+      </p:grpSp>
+      <p:grpSp>
+        <p:nvGrpSpPr>
+          <p:cNvPr id="7" name="Group 6">
+            <a:extLst>
+              <a:ext uri="{FF2B5EF4-FFF2-40B4-BE49-F238E27FC236}">
+                <a16:creationId xmlns:a16="http://schemas.microsoft.com/office/drawing/2014/main" id="{D8BF47EB-5D25-7980-17B5-9826F098B01D}"/>
+              </a:ext>
+            </a:extLst>
+          </p:cNvPr>
+          <p:cNvGrpSpPr/>
+          <p:nvPr/>
+        </p:nvGrpSpPr>
+        <p:grpSpPr>
+          <a:xfrm>
+            <a:off x="6169152" y="270357"/>
+            <a:ext cx="5946648" cy="4886416"/>
+            <a:chOff x="624078" y="270357"/>
+            <a:chExt cx="5869258" cy="4886416"/>
+          </a:xfrm>
+        </p:grpSpPr>
+        <p:sp>
+          <p:nvSpPr>
+            <p:cNvPr id="8" name="TextBox 7">
+              <a:extLst>
+                <a:ext uri="{FF2B5EF4-FFF2-40B4-BE49-F238E27FC236}">
+                  <a16:creationId xmlns:a16="http://schemas.microsoft.com/office/drawing/2014/main" id="{CB8F76C9-3560-34EE-B3A9-E22A7DC9FF7B}"/>
+                </a:ext>
+              </a:extLst>
+            </p:cNvPr>
+            <p:cNvSpPr txBox="1"/>
+            <p:nvPr/>
+          </p:nvSpPr>
+          <p:spPr>
+            <a:xfrm>
+              <a:off x="624078" y="1369582"/>
+              <a:ext cx="5869258" cy="3787191"/>
+            </a:xfrm>
+            <a:prstGeom prst="rect">
+              <a:avLst/>
+            </a:prstGeom>
+            <a:noFill/>
+          </p:spPr>
+          <p:txBody>
+            <a:bodyPr wrap="square">
+              <a:spAutoFit/>
+            </a:bodyPr>
+            <a:lstStyle/>
+            <a:p>
+              <a:pPr>
+                <a:lnSpc>
+                  <a:spcPct val="150000"/>
+                </a:lnSpc>
+              </a:pPr>
+              <a:r>
+                <a:rPr lang="en-GB" dirty="0">
+                  <a:latin typeface="Fira Sans" panose="020B0503050000020004" pitchFamily="34" charset="0"/>
+                </a:rPr>
+                <a:t>Today you learned:</a:t>
+              </a:r>
+            </a:p>
+            <a:p>
+              <a:pPr marL="285750" indent="-285750">
+                <a:lnSpc>
+                  <a:spcPct val="150000"/>
+                </a:lnSpc>
+                <a:buFont typeface="Arial" panose="020B0604020202020204" pitchFamily="34" charset="0"/>
+                <a:buChar char="•"/>
+              </a:pPr>
+              <a:r>
+                <a:rPr lang="en-GB" dirty="0">
+                  <a:latin typeface="Fira Sans" panose="020B0503050000020004" pitchFamily="34" charset="0"/>
+                </a:rPr>
+                <a:t>✓ </a:t>
+              </a:r>
+              <a:r>
+                <a:rPr lang="en-US" dirty="0">
+                  <a:solidFill>
+                    <a:srgbClr val="212529"/>
+                  </a:solidFill>
+                  <a:latin typeface="Fira Sans" panose="020B0503050000020004" pitchFamily="34" charset="0"/>
+                </a:rPr>
+                <a:t>Apply different normalization methods to proteomic data</a:t>
+              </a:r>
+            </a:p>
+            <a:p>
+              <a:pPr marL="285750" indent="-285750">
+                <a:lnSpc>
+                  <a:spcPct val="150000"/>
+                </a:lnSpc>
+                <a:buFont typeface="Arial" panose="020B0604020202020204" pitchFamily="34" charset="0"/>
+                <a:buChar char="•"/>
+              </a:pPr>
+              <a:r>
+                <a:rPr lang="en-GB" dirty="0">
+                  <a:latin typeface="Fira Sans" panose="020B0503050000020004" pitchFamily="34" charset="0"/>
+                </a:rPr>
+                <a:t>✓ </a:t>
+              </a:r>
+              <a:r>
+                <a:rPr lang="en-US" dirty="0">
+                  <a:solidFill>
+                    <a:srgbClr val="212529"/>
+                  </a:solidFill>
+                  <a:latin typeface="Fira Sans" panose="020B0503050000020004" pitchFamily="34" charset="0"/>
+                </a:rPr>
+                <a:t>Perform batch effect correction</a:t>
+              </a:r>
+            </a:p>
+            <a:p>
+              <a:pPr marL="285750" indent="-285750">
+                <a:lnSpc>
+                  <a:spcPct val="150000"/>
+                </a:lnSpc>
+                <a:buFont typeface="Arial" panose="020B0604020202020204" pitchFamily="34" charset="0"/>
+                <a:buChar char="•"/>
+              </a:pPr>
+              <a:r>
+                <a:rPr lang="en-GB" dirty="0">
+                  <a:latin typeface="Fira Sans" panose="020B0503050000020004" pitchFamily="34" charset="0"/>
+                </a:rPr>
+                <a:t>✓ </a:t>
+              </a:r>
+              <a:r>
+                <a:rPr lang="en-US" dirty="0">
+                  <a:solidFill>
+                    <a:srgbClr val="212529"/>
+                  </a:solidFill>
+                  <a:latin typeface="Fira Sans" panose="020B0503050000020004" pitchFamily="34" charset="0"/>
+                </a:rPr>
+                <a:t>Conduct differential expression analysis using `</a:t>
+              </a:r>
+              <a:r>
+                <a:rPr lang="en-US" dirty="0" err="1">
+                  <a:solidFill>
+                    <a:srgbClr val="212529"/>
+                  </a:solidFill>
+                  <a:latin typeface="Fira Sans" panose="020B0503050000020004" pitchFamily="34" charset="0"/>
+                </a:rPr>
+                <a:t>limma</a:t>
+              </a:r>
+              <a:r>
+                <a:rPr lang="en-US" dirty="0">
+                  <a:solidFill>
+                    <a:srgbClr val="212529"/>
+                  </a:solidFill>
+                  <a:latin typeface="Fira Sans" panose="020B0503050000020004" pitchFamily="34" charset="0"/>
+                </a:rPr>
+                <a:t>`</a:t>
+              </a:r>
+            </a:p>
+            <a:p>
+              <a:pPr marL="285750" indent="-285750">
+                <a:lnSpc>
+                  <a:spcPct val="150000"/>
+                </a:lnSpc>
+                <a:buFont typeface="Arial" panose="020B0604020202020204" pitchFamily="34" charset="0"/>
+                <a:buChar char="•"/>
+              </a:pPr>
+              <a:r>
+                <a:rPr lang="en-GB" dirty="0">
+                  <a:latin typeface="Fira Sans" panose="020B0503050000020004" pitchFamily="34" charset="0"/>
+                </a:rPr>
+                <a:t>✓ </a:t>
+              </a:r>
+              <a:r>
+                <a:rPr lang="en-US" dirty="0">
+                  <a:solidFill>
+                    <a:srgbClr val="212529"/>
+                  </a:solidFill>
+                  <a:latin typeface="Fira Sans" panose="020B0503050000020004" pitchFamily="34" charset="0"/>
+                </a:rPr>
+                <a:t>Interpret and visualize differential expression results</a:t>
+              </a:r>
+            </a:p>
+            <a:p>
+              <a:pPr marL="285750" indent="-285750">
+                <a:lnSpc>
+                  <a:spcPct val="150000"/>
+                </a:lnSpc>
+                <a:buFont typeface="Arial" panose="020B0604020202020204" pitchFamily="34" charset="0"/>
+                <a:buChar char="•"/>
+              </a:pPr>
+              <a:r>
+                <a:rPr lang="en-GB" dirty="0">
+                  <a:latin typeface="Fira Sans" panose="020B0503050000020004" pitchFamily="34" charset="0"/>
+                </a:rPr>
+                <a:t>✓ </a:t>
+              </a:r>
+              <a:r>
+                <a:rPr lang="en-US" dirty="0">
+                  <a:solidFill>
+                    <a:srgbClr val="212529"/>
+                  </a:solidFill>
+                  <a:latin typeface="Fira Sans" panose="020B0503050000020004" pitchFamily="34" charset="0"/>
+                </a:rPr>
+                <a:t>Create volcano plots and MA plots</a:t>
+              </a:r>
+              <a:endParaRPr lang="en-US" dirty="0">
+                <a:latin typeface="Fira Sans" panose="020B0503050000020004" pitchFamily="34" charset="0"/>
+              </a:endParaRPr>
+            </a:p>
+          </p:txBody>
+        </p:sp>
+        <p:sp>
+          <p:nvSpPr>
+            <p:cNvPr id="9" name="TextBox 8">
+              <a:extLst>
+                <a:ext uri="{FF2B5EF4-FFF2-40B4-BE49-F238E27FC236}">
+                  <a16:creationId xmlns:a16="http://schemas.microsoft.com/office/drawing/2014/main" id="{8979BF9D-074F-C8EF-EDAF-419880F72D38}"/>
+                </a:ext>
+              </a:extLst>
+            </p:cNvPr>
+            <p:cNvSpPr txBox="1"/>
+            <p:nvPr/>
+          </p:nvSpPr>
+          <p:spPr>
+            <a:xfrm>
+              <a:off x="624078" y="270357"/>
+              <a:ext cx="5154930" cy="672235"/>
+            </a:xfrm>
+            <a:prstGeom prst="rect">
+              <a:avLst/>
+            </a:prstGeom>
+            <a:noFill/>
+          </p:spPr>
+          <p:txBody>
+            <a:bodyPr wrap="square">
+              <a:spAutoFit/>
+            </a:bodyPr>
+            <a:lstStyle/>
+            <a:p>
+              <a:pPr algn="l">
+                <a:lnSpc>
+                  <a:spcPct val="150000"/>
+                </a:lnSpc>
+                <a:buNone/>
+              </a:pPr>
+              <a:r>
+                <a:rPr lang="en-US" sz="2800" b="0" i="0" dirty="0">
+                  <a:solidFill>
+                    <a:srgbClr val="1A292C"/>
+                  </a:solidFill>
+                  <a:effectLst/>
+                  <a:latin typeface="Fira Sans" panose="020B0503050000020004" pitchFamily="34" charset="0"/>
+                </a:rPr>
+                <a:t>Day </a:t>
+              </a:r>
+              <a:r>
+                <a:rPr lang="en-US" sz="2800" dirty="0">
+                  <a:solidFill>
+                    <a:srgbClr val="1A292C"/>
+                  </a:solidFill>
+                  <a:latin typeface="Fira Sans" panose="020B0503050000020004" pitchFamily="34" charset="0"/>
+                </a:rPr>
+                <a:t>3</a:t>
+              </a:r>
+              <a:r>
+                <a:rPr lang="en-US" sz="2800" b="0" i="0" dirty="0">
+                  <a:solidFill>
+                    <a:srgbClr val="1A292C"/>
+                  </a:solidFill>
+                  <a:effectLst/>
+                  <a:latin typeface="Fira Sans" panose="020B0503050000020004" pitchFamily="34" charset="0"/>
+                </a:rPr>
+                <a:t> Summary</a:t>
+              </a:r>
+            </a:p>
+          </p:txBody>
+        </p:sp>
+      </p:grpSp>
     </p:spTree>
     <p:extLst>
       <p:ext uri="{BB962C8B-B14F-4D97-AF65-F5344CB8AC3E}">
-        <p14:creationId xmlns:p14="http://schemas.microsoft.com/office/powerpoint/2010/main" val="1539743464"/>
+        <p14:creationId xmlns:p14="http://schemas.microsoft.com/office/powerpoint/2010/main" val="226909757"/>
       </p:ext>
     </p:extLst>
   </p:cSld>
@@ -9503,7 +10432,13 @@
   <p:cSld>
     <p:spTree>
       <p:nvGrpSpPr>
-        <p:cNvPr id="1" name=""/>
+        <p:cNvPr id="1" name="">
+          <a:extLst>
+            <a:ext uri="{FF2B5EF4-FFF2-40B4-BE49-F238E27FC236}">
+              <a16:creationId xmlns:a16="http://schemas.microsoft.com/office/drawing/2014/main" id="{11EB15CF-E6DA-FCC8-5AFE-97D63C8A9D89}"/>
+            </a:ext>
+          </a:extLst>
+        </p:cNvPr>
         <p:cNvGrpSpPr/>
         <p:nvPr/>
       </p:nvGrpSpPr>
@@ -9515,10 +10450,343 @@
           <a:chExt cx="0" cy="0"/>
         </a:xfrm>
       </p:grpSpPr>
+      <p:grpSp>
+        <p:nvGrpSpPr>
+          <p:cNvPr id="4" name="Group 3">
+            <a:extLst>
+              <a:ext uri="{FF2B5EF4-FFF2-40B4-BE49-F238E27FC236}">
+                <a16:creationId xmlns:a16="http://schemas.microsoft.com/office/drawing/2014/main" id="{0EB5BCAA-00E9-2D81-592C-971F28D67D2A}"/>
+              </a:ext>
+            </a:extLst>
+          </p:cNvPr>
+          <p:cNvGrpSpPr/>
+          <p:nvPr/>
+        </p:nvGrpSpPr>
+        <p:grpSpPr>
+          <a:xfrm>
+            <a:off x="493777" y="270357"/>
+            <a:ext cx="5529072" cy="2810847"/>
+            <a:chOff x="624078" y="270357"/>
+            <a:chExt cx="5154930" cy="2810847"/>
+          </a:xfrm>
+        </p:grpSpPr>
+        <p:sp>
+          <p:nvSpPr>
+            <p:cNvPr id="5" name="TextBox 4">
+              <a:extLst>
+                <a:ext uri="{FF2B5EF4-FFF2-40B4-BE49-F238E27FC236}">
+                  <a16:creationId xmlns:a16="http://schemas.microsoft.com/office/drawing/2014/main" id="{411EBA82-F3AE-35F8-E43F-DB7CB82228C8}"/>
+                </a:ext>
+              </a:extLst>
+            </p:cNvPr>
+            <p:cNvSpPr txBox="1"/>
+            <p:nvPr/>
+          </p:nvSpPr>
+          <p:spPr>
+            <a:xfrm>
+              <a:off x="624078" y="1369582"/>
+              <a:ext cx="5154930" cy="1711622"/>
+            </a:xfrm>
+            <a:prstGeom prst="rect">
+              <a:avLst/>
+            </a:prstGeom>
+            <a:noFill/>
+          </p:spPr>
+          <p:txBody>
+            <a:bodyPr wrap="square">
+              <a:spAutoFit/>
+            </a:bodyPr>
+            <a:lstStyle/>
+            <a:p>
+              <a:pPr algn="l">
+                <a:lnSpc>
+                  <a:spcPct val="150000"/>
+                </a:lnSpc>
+                <a:buNone/>
+              </a:pPr>
+              <a:r>
+                <a:rPr lang="en-US" b="1" i="0" dirty="0">
+                  <a:solidFill>
+                    <a:srgbClr val="212529"/>
+                  </a:solidFill>
+                  <a:effectLst/>
+                  <a:latin typeface="Fira Sans" panose="020B0503050000020004" pitchFamily="34" charset="0"/>
+                </a:rPr>
+                <a:t>Learning Objectives:</a:t>
+              </a:r>
+            </a:p>
+            <a:p>
+              <a:pPr algn="l">
+                <a:lnSpc>
+                  <a:spcPct val="150000"/>
+                </a:lnSpc>
+                <a:buNone/>
+              </a:pPr>
+              <a:r>
+                <a:rPr lang="en-US" b="0" i="0" dirty="0">
+                  <a:solidFill>
+                    <a:srgbClr val="212529"/>
+                  </a:solidFill>
+                  <a:effectLst/>
+                  <a:latin typeface="Fira Sans" panose="020B0503050000020004" pitchFamily="34" charset="0"/>
+                </a:rPr>
+                <a:t>By the end of Day 4, you will be able to perform:</a:t>
+              </a:r>
+            </a:p>
+            <a:p>
+              <a:pPr marL="285750" indent="-285750">
+                <a:lnSpc>
+                  <a:spcPct val="150000"/>
+                </a:lnSpc>
+                <a:buFont typeface="Arial" panose="020B0604020202020204" pitchFamily="34" charset="0"/>
+                <a:buChar char="•"/>
+              </a:pPr>
+              <a:r>
+                <a:rPr lang="en-GB" dirty="0">
+                  <a:latin typeface="Fira Sans" panose="020B0503050000020004" pitchFamily="34" charset="0"/>
+                </a:rPr>
+                <a:t>Module 1: Functional Enrichment &amp; GSEA</a:t>
+              </a:r>
+            </a:p>
+            <a:p>
+              <a:pPr marL="285750" indent="-285750">
+                <a:lnSpc>
+                  <a:spcPct val="150000"/>
+                </a:lnSpc>
+                <a:buFont typeface="Arial" panose="020B0604020202020204" pitchFamily="34" charset="0"/>
+                <a:buChar char="•"/>
+              </a:pPr>
+              <a:r>
+                <a:rPr lang="en-GB" dirty="0">
+                  <a:latin typeface="Fira Sans" panose="020B0503050000020004" pitchFamily="34" charset="0"/>
+                </a:rPr>
+                <a:t>Module 2: Public Data integration</a:t>
+              </a:r>
+            </a:p>
+          </p:txBody>
+        </p:sp>
+        <p:sp>
+          <p:nvSpPr>
+            <p:cNvPr id="6" name="TextBox 5">
+              <a:extLst>
+                <a:ext uri="{FF2B5EF4-FFF2-40B4-BE49-F238E27FC236}">
+                  <a16:creationId xmlns:a16="http://schemas.microsoft.com/office/drawing/2014/main" id="{8747D1AC-ED87-36D8-2225-32CE7A87D3E1}"/>
+                </a:ext>
+              </a:extLst>
+            </p:cNvPr>
+            <p:cNvSpPr txBox="1"/>
+            <p:nvPr/>
+          </p:nvSpPr>
+          <p:spPr>
+            <a:xfrm>
+              <a:off x="624078" y="270357"/>
+              <a:ext cx="5154930" cy="465064"/>
+            </a:xfrm>
+            <a:prstGeom prst="rect">
+              <a:avLst/>
+            </a:prstGeom>
+            <a:noFill/>
+          </p:spPr>
+          <p:txBody>
+            <a:bodyPr wrap="square">
+              <a:spAutoFit/>
+            </a:bodyPr>
+            <a:lstStyle/>
+            <a:p>
+              <a:pPr>
+                <a:lnSpc>
+                  <a:spcPct val="150000"/>
+                </a:lnSpc>
+              </a:pPr>
+              <a:r>
+                <a:rPr lang="en-US" b="1" dirty="0">
+                  <a:latin typeface="Fira Sans" panose="020B0503050000020004" pitchFamily="34" charset="0"/>
+                  <a:hlinkClick r:id="rId2" action="ppaction://hlinkfile"/>
+                </a:rPr>
+                <a:t>Functional Analysis, Longitudinal &amp; Public Data</a:t>
+              </a:r>
+              <a:endParaRPr lang="en-US" sz="4400" b="0" i="0" dirty="0">
+                <a:solidFill>
+                  <a:srgbClr val="1A292C"/>
+                </a:solidFill>
+                <a:effectLst/>
+                <a:latin typeface="Fira Sans" panose="020B0503050000020004" pitchFamily="34" charset="0"/>
+              </a:endParaRPr>
+            </a:p>
+          </p:txBody>
+        </p:sp>
+      </p:grpSp>
+      <p:grpSp>
+        <p:nvGrpSpPr>
+          <p:cNvPr id="7" name="Group 6">
+            <a:extLst>
+              <a:ext uri="{FF2B5EF4-FFF2-40B4-BE49-F238E27FC236}">
+                <a16:creationId xmlns:a16="http://schemas.microsoft.com/office/drawing/2014/main" id="{8B61908C-E107-33B9-0723-A58D5516E8DB}"/>
+              </a:ext>
+            </a:extLst>
+          </p:cNvPr>
+          <p:cNvGrpSpPr/>
+          <p:nvPr/>
+        </p:nvGrpSpPr>
+        <p:grpSpPr>
+          <a:xfrm>
+            <a:off x="6169152" y="270357"/>
+            <a:ext cx="5946648" cy="2811040"/>
+            <a:chOff x="624078" y="270357"/>
+            <a:chExt cx="5869258" cy="2811040"/>
+          </a:xfrm>
+        </p:grpSpPr>
+        <p:sp>
+          <p:nvSpPr>
+            <p:cNvPr id="8" name="TextBox 7">
+              <a:extLst>
+                <a:ext uri="{FF2B5EF4-FFF2-40B4-BE49-F238E27FC236}">
+                  <a16:creationId xmlns:a16="http://schemas.microsoft.com/office/drawing/2014/main" id="{C5C63589-B290-AA70-03AA-45F8C2D4CDE3}"/>
+                </a:ext>
+              </a:extLst>
+            </p:cNvPr>
+            <p:cNvSpPr txBox="1"/>
+            <p:nvPr/>
+          </p:nvSpPr>
+          <p:spPr>
+            <a:xfrm>
+              <a:off x="624078" y="1369582"/>
+              <a:ext cx="5869258" cy="1711815"/>
+            </a:xfrm>
+            <a:prstGeom prst="rect">
+              <a:avLst/>
+            </a:prstGeom>
+            <a:noFill/>
+          </p:spPr>
+          <p:txBody>
+            <a:bodyPr wrap="square">
+              <a:spAutoFit/>
+            </a:bodyPr>
+            <a:lstStyle/>
+            <a:p>
+              <a:pPr>
+                <a:lnSpc>
+                  <a:spcPct val="150000"/>
+                </a:lnSpc>
+              </a:pPr>
+              <a:r>
+                <a:rPr lang="en-GB" dirty="0">
+                  <a:latin typeface="Fira Sans" panose="020B0503050000020004" pitchFamily="34" charset="0"/>
+                </a:rPr>
+                <a:t>Today you learned:</a:t>
+              </a:r>
+            </a:p>
+            <a:p>
+              <a:pPr>
+                <a:lnSpc>
+                  <a:spcPct val="150000"/>
+                </a:lnSpc>
+              </a:pPr>
+              <a:r>
+                <a:rPr lang="en-GB" dirty="0">
+                  <a:latin typeface="Fira Sans" panose="020B0503050000020004" pitchFamily="34" charset="0"/>
+                </a:rPr>
+                <a:t>✓ </a:t>
+              </a:r>
+              <a:r>
+                <a:rPr lang="en-US" dirty="0">
+                  <a:latin typeface="Fira Sans" panose="020B0503050000020004" pitchFamily="34" charset="0"/>
+                </a:rPr>
+                <a:t>Interpret DE results biologically</a:t>
+              </a:r>
+            </a:p>
+            <a:p>
+              <a:pPr>
+                <a:lnSpc>
+                  <a:spcPct val="150000"/>
+                </a:lnSpc>
+              </a:pPr>
+              <a:r>
+                <a:rPr lang="en-GB" dirty="0">
+                  <a:latin typeface="Fira Sans" panose="020B0503050000020004" pitchFamily="34" charset="0"/>
+                </a:rPr>
+                <a:t>✓ </a:t>
+              </a:r>
+              <a:r>
+                <a:rPr lang="en-US" dirty="0">
+                  <a:latin typeface="Fira Sans" panose="020B0503050000020004" pitchFamily="34" charset="0"/>
+                </a:rPr>
+                <a:t>Explore longitudinal trajectories</a:t>
+              </a:r>
+            </a:p>
+            <a:p>
+              <a:pPr>
+                <a:lnSpc>
+                  <a:spcPct val="150000"/>
+                </a:lnSpc>
+              </a:pPr>
+              <a:r>
+                <a:rPr lang="en-GB" dirty="0">
+                  <a:latin typeface="Fira Sans" panose="020B0503050000020004" pitchFamily="34" charset="0"/>
+                </a:rPr>
+                <a:t>✓ </a:t>
+              </a:r>
+              <a:r>
+                <a:rPr lang="en-US" dirty="0">
+                  <a:latin typeface="Fira Sans" panose="020B0503050000020004" pitchFamily="34" charset="0"/>
+                </a:rPr>
+                <a:t>Work with public datasets</a:t>
+              </a:r>
+            </a:p>
+          </p:txBody>
+        </p:sp>
+        <p:sp>
+          <p:nvSpPr>
+            <p:cNvPr id="9" name="TextBox 8">
+              <a:extLst>
+                <a:ext uri="{FF2B5EF4-FFF2-40B4-BE49-F238E27FC236}">
+                  <a16:creationId xmlns:a16="http://schemas.microsoft.com/office/drawing/2014/main" id="{DAF0B2C5-393B-8A0D-E03C-9202C77693A7}"/>
+                </a:ext>
+              </a:extLst>
+            </p:cNvPr>
+            <p:cNvSpPr txBox="1"/>
+            <p:nvPr/>
+          </p:nvSpPr>
+          <p:spPr>
+            <a:xfrm>
+              <a:off x="624078" y="270357"/>
+              <a:ext cx="5154930" cy="672235"/>
+            </a:xfrm>
+            <a:prstGeom prst="rect">
+              <a:avLst/>
+            </a:prstGeom>
+            <a:noFill/>
+          </p:spPr>
+          <p:txBody>
+            <a:bodyPr wrap="square">
+              <a:spAutoFit/>
+            </a:bodyPr>
+            <a:lstStyle/>
+            <a:p>
+              <a:pPr algn="l">
+                <a:lnSpc>
+                  <a:spcPct val="150000"/>
+                </a:lnSpc>
+                <a:buNone/>
+              </a:pPr>
+              <a:r>
+                <a:rPr lang="en-US" sz="2800" b="0" i="0" dirty="0">
+                  <a:solidFill>
+                    <a:srgbClr val="1A292C"/>
+                  </a:solidFill>
+                  <a:effectLst/>
+                  <a:latin typeface="Fira Sans" panose="020B0503050000020004" pitchFamily="34" charset="0"/>
+                </a:rPr>
+                <a:t>Day 4 Summary</a:t>
+              </a:r>
+            </a:p>
+          </p:txBody>
+        </p:sp>
+      </p:grpSp>
     </p:spTree>
     <p:extLst>
       <p:ext uri="{BB962C8B-B14F-4D97-AF65-F5344CB8AC3E}">
-        <p14:creationId xmlns:p14="http://schemas.microsoft.com/office/powerpoint/2010/main" val="1444824505"/>
+        <p14:creationId xmlns:p14="http://schemas.microsoft.com/office/powerpoint/2010/main" val="2175383292"/>
       </p:ext>
     </p:extLst>
   </p:cSld>
@@ -9533,7 +10801,13 @@
   <p:cSld>
     <p:spTree>
       <p:nvGrpSpPr>
-        <p:cNvPr id="1" name=""/>
+        <p:cNvPr id="1" name="">
+          <a:extLst>
+            <a:ext uri="{FF2B5EF4-FFF2-40B4-BE49-F238E27FC236}">
+              <a16:creationId xmlns:a16="http://schemas.microsoft.com/office/drawing/2014/main" id="{7BE73B58-32F8-5A8B-62B2-B2EA29E1E6D3}"/>
+            </a:ext>
+          </a:extLst>
+        </p:cNvPr>
         <p:cNvGrpSpPr/>
         <p:nvPr/>
       </p:nvGrpSpPr>
@@ -9545,10 +10819,466 @@
           <a:chExt cx="0" cy="0"/>
         </a:xfrm>
       </p:grpSpPr>
+      <p:grpSp>
+        <p:nvGrpSpPr>
+          <p:cNvPr id="4" name="Group 3">
+            <a:extLst>
+              <a:ext uri="{FF2B5EF4-FFF2-40B4-BE49-F238E27FC236}">
+                <a16:creationId xmlns:a16="http://schemas.microsoft.com/office/drawing/2014/main" id="{65856232-84D3-1727-8C54-CBB27D4D50E8}"/>
+              </a:ext>
+            </a:extLst>
+          </p:cNvPr>
+          <p:cNvGrpSpPr/>
+          <p:nvPr/>
+        </p:nvGrpSpPr>
+        <p:grpSpPr>
+          <a:xfrm>
+            <a:off x="493777" y="270357"/>
+            <a:ext cx="5529072" cy="5677914"/>
+            <a:chOff x="624078" y="270357"/>
+            <a:chExt cx="5154930" cy="5677914"/>
+          </a:xfrm>
+        </p:grpSpPr>
+        <p:sp>
+          <p:nvSpPr>
+            <p:cNvPr id="5" name="TextBox 4">
+              <a:extLst>
+                <a:ext uri="{FF2B5EF4-FFF2-40B4-BE49-F238E27FC236}">
+                  <a16:creationId xmlns:a16="http://schemas.microsoft.com/office/drawing/2014/main" id="{91A67873-3E2F-11B9-25B3-69B32E10E0AC}"/>
+                </a:ext>
+              </a:extLst>
+            </p:cNvPr>
+            <p:cNvSpPr txBox="1"/>
+            <p:nvPr/>
+          </p:nvSpPr>
+          <p:spPr>
+            <a:xfrm>
+              <a:off x="624078" y="1369582"/>
+              <a:ext cx="5154930" cy="4578689"/>
+            </a:xfrm>
+            <a:prstGeom prst="rect">
+              <a:avLst/>
+            </a:prstGeom>
+            <a:noFill/>
+          </p:spPr>
+          <p:txBody>
+            <a:bodyPr wrap="square">
+              <a:spAutoFit/>
+            </a:bodyPr>
+            <a:lstStyle/>
+            <a:p>
+              <a:pPr algn="l">
+                <a:lnSpc>
+                  <a:spcPct val="150000"/>
+                </a:lnSpc>
+                <a:buNone/>
+              </a:pPr>
+              <a:r>
+                <a:rPr lang="en-GB" b="1" i="0" dirty="0">
+                  <a:solidFill>
+                    <a:srgbClr val="212529"/>
+                  </a:solidFill>
+                  <a:effectLst/>
+                  <a:latin typeface="Fira Sans" panose="020B0503050000020004" pitchFamily="34" charset="0"/>
+                </a:rPr>
+                <a:t>Modules</a:t>
+              </a:r>
+            </a:p>
+            <a:p>
+              <a:pPr marL="285750" indent="-285750" algn="l">
+                <a:lnSpc>
+                  <a:spcPct val="150000"/>
+                </a:lnSpc>
+                <a:buFont typeface="Wingdings" panose="05000000000000000000" pitchFamily="2" charset="2"/>
+                <a:buChar char="q"/>
+              </a:pPr>
+              <a:r>
+                <a:rPr lang="en-GB" b="0" i="0" dirty="0">
+                  <a:solidFill>
+                    <a:srgbClr val="212529"/>
+                  </a:solidFill>
+                  <a:effectLst/>
+                  <a:latin typeface="Fira Sans" panose="020B0503050000020004" pitchFamily="34" charset="0"/>
+                </a:rPr>
+                <a:t>Full Analysis Pipeline</a:t>
+              </a:r>
+            </a:p>
+            <a:p>
+              <a:pPr marL="285750" indent="-285750" algn="l">
+                <a:lnSpc>
+                  <a:spcPct val="150000"/>
+                </a:lnSpc>
+                <a:buFont typeface="Arial" panose="020B0604020202020204" pitchFamily="34" charset="0"/>
+                <a:buChar char="•"/>
+              </a:pPr>
+              <a:r>
+                <a:rPr lang="en-GB" sz="1600" b="0" i="0" dirty="0">
+                  <a:solidFill>
+                    <a:srgbClr val="212529"/>
+                  </a:solidFill>
+                  <a:effectLst/>
+                  <a:latin typeface="Fira Sans" panose="020B0503050000020004" pitchFamily="34" charset="0"/>
+                </a:rPr>
+                <a:t>From QC → normalization → DE → functional → longitudinal (if relevant).</a:t>
+              </a:r>
+              <a:br>
+                <a:rPr lang="en-GB" b="0" i="0" dirty="0">
+                  <a:solidFill>
+                    <a:srgbClr val="212529"/>
+                  </a:solidFill>
+                  <a:effectLst/>
+                  <a:latin typeface="Fira Sans" panose="020B0503050000020004" pitchFamily="34" charset="0"/>
+                </a:rPr>
+              </a:br>
+              <a:r>
+                <a:rPr lang="en-GB" sz="1200" b="0" i="0" dirty="0">
+                  <a:solidFill>
+                    <a:srgbClr val="212529"/>
+                  </a:solidFill>
+                  <a:effectLst/>
+                  <a:latin typeface="Fira Sans" panose="020B0503050000020004" pitchFamily="34" charset="0"/>
+                </a:rPr>
+                <a:t>Run through all steps on a provided dataset (or participants’ data).</a:t>
+              </a:r>
+            </a:p>
+            <a:p>
+              <a:pPr marL="285750" indent="-285750" algn="l">
+                <a:lnSpc>
+                  <a:spcPct val="150000"/>
+                </a:lnSpc>
+                <a:buFont typeface="Wingdings" panose="05000000000000000000" pitchFamily="2" charset="2"/>
+                <a:buChar char="q"/>
+              </a:pPr>
+              <a:r>
+                <a:rPr lang="en-GB" b="0" i="0" dirty="0">
+                  <a:solidFill>
+                    <a:srgbClr val="212529"/>
+                  </a:solidFill>
+                  <a:effectLst/>
+                  <a:latin typeface="Fira Sans" panose="020B0503050000020004" pitchFamily="34" charset="0"/>
+                </a:rPr>
+                <a:t>Group Discussion &amp; Interpretation</a:t>
+              </a:r>
+            </a:p>
+            <a:p>
+              <a:pPr marL="285750" indent="-285750" algn="l">
+                <a:lnSpc>
+                  <a:spcPct val="150000"/>
+                </a:lnSpc>
+                <a:buFont typeface="Arial" panose="020B0604020202020204" pitchFamily="34" charset="0"/>
+                <a:buChar char="•"/>
+              </a:pPr>
+              <a:r>
+                <a:rPr lang="en-GB" sz="1600" b="0" i="0" dirty="0">
+                  <a:solidFill>
+                    <a:srgbClr val="212529"/>
+                  </a:solidFill>
+                  <a:effectLst/>
+                  <a:latin typeface="Fira Sans" panose="020B0503050000020004" pitchFamily="34" charset="0"/>
+                </a:rPr>
+                <a:t>Interpret results, compare across participants, discuss limitations, challenges, possible variations.</a:t>
+              </a:r>
+            </a:p>
+            <a:p>
+              <a:pPr marL="285750" indent="-285750" algn="l">
+                <a:lnSpc>
+                  <a:spcPct val="150000"/>
+                </a:lnSpc>
+                <a:buFont typeface="Wingdings" panose="05000000000000000000" pitchFamily="2" charset="2"/>
+                <a:buChar char="q"/>
+              </a:pPr>
+              <a:r>
+                <a:rPr lang="en-GB" b="0" i="0" dirty="0">
+                  <a:solidFill>
+                    <a:srgbClr val="212529"/>
+                  </a:solidFill>
+                  <a:effectLst/>
+                  <a:latin typeface="Fira Sans" panose="020B0503050000020004" pitchFamily="34" charset="0"/>
+                </a:rPr>
+                <a:t>Presentation &amp; Reporting</a:t>
+              </a:r>
+            </a:p>
+            <a:p>
+              <a:pPr marL="285750" indent="-285750" algn="l">
+                <a:lnSpc>
+                  <a:spcPct val="150000"/>
+                </a:lnSpc>
+                <a:buFont typeface="Arial" panose="020B0604020202020204" pitchFamily="34" charset="0"/>
+                <a:buChar char="•"/>
+              </a:pPr>
+              <a:r>
+                <a:rPr lang="en-GB" sz="1600" b="0" i="0" dirty="0">
+                  <a:solidFill>
+                    <a:srgbClr val="212529"/>
+                  </a:solidFill>
+                  <a:effectLst/>
+                  <a:latin typeface="Fira Sans" panose="020B0503050000020004" pitchFamily="34" charset="0"/>
+                </a:rPr>
+                <a:t>Generate basic report/graphics (ggplot2), integrate into R Markdown / html / PDF.</a:t>
+              </a:r>
+              <a:br>
+                <a:rPr lang="en-GB" sz="1600" b="0" i="0" dirty="0">
+                  <a:solidFill>
+                    <a:srgbClr val="212529"/>
+                  </a:solidFill>
+                  <a:effectLst/>
+                  <a:latin typeface="Fira Sans" panose="020B0503050000020004" pitchFamily="34" charset="0"/>
+                </a:rPr>
+              </a:br>
+              <a:r>
+                <a:rPr lang="en-GB" sz="1600" b="0" i="0" dirty="0">
+                  <a:solidFill>
+                    <a:srgbClr val="212529"/>
+                  </a:solidFill>
+                  <a:effectLst/>
+                  <a:latin typeface="Fira Sans" panose="020B0503050000020004" pitchFamily="34" charset="0"/>
+                </a:rPr>
+                <a:t>Provide guidance for next steps.</a:t>
+              </a:r>
+            </a:p>
+          </p:txBody>
+        </p:sp>
+        <p:sp>
+          <p:nvSpPr>
+            <p:cNvPr id="6" name="TextBox 5">
+              <a:extLst>
+                <a:ext uri="{FF2B5EF4-FFF2-40B4-BE49-F238E27FC236}">
+                  <a16:creationId xmlns:a16="http://schemas.microsoft.com/office/drawing/2014/main" id="{5182F423-B178-6D5E-07FE-6572830A50C3}"/>
+                </a:ext>
+              </a:extLst>
+            </p:cNvPr>
+            <p:cNvSpPr txBox="1"/>
+            <p:nvPr/>
+          </p:nvSpPr>
+          <p:spPr>
+            <a:xfrm>
+              <a:off x="624078" y="270357"/>
+              <a:ext cx="5154930" cy="465064"/>
+            </a:xfrm>
+            <a:prstGeom prst="rect">
+              <a:avLst/>
+            </a:prstGeom>
+            <a:noFill/>
+          </p:spPr>
+          <p:txBody>
+            <a:bodyPr wrap="square">
+              <a:spAutoFit/>
+            </a:bodyPr>
+            <a:lstStyle/>
+            <a:p>
+              <a:pPr>
+                <a:lnSpc>
+                  <a:spcPct val="150000"/>
+                </a:lnSpc>
+              </a:pPr>
+              <a:r>
+                <a:rPr lang="en-GB" b="1" u="sng" dirty="0">
+                  <a:latin typeface="Fira Sans" panose="020B0503050000020004" pitchFamily="34" charset="0"/>
+                  <a:hlinkClick r:id="rId2" action="ppaction://hlinkfile"/>
+                </a:rPr>
+                <a:t>Application on Real Data</a:t>
+              </a:r>
+              <a:endParaRPr lang="en-US" sz="4400" b="0" i="0" dirty="0">
+                <a:solidFill>
+                  <a:srgbClr val="1A292C"/>
+                </a:solidFill>
+                <a:effectLst/>
+                <a:latin typeface="Fira Sans" panose="020B0503050000020004" pitchFamily="34" charset="0"/>
+              </a:endParaRPr>
+            </a:p>
+          </p:txBody>
+        </p:sp>
+      </p:grpSp>
+      <p:grpSp>
+        <p:nvGrpSpPr>
+          <p:cNvPr id="7" name="Group 6">
+            <a:extLst>
+              <a:ext uri="{FF2B5EF4-FFF2-40B4-BE49-F238E27FC236}">
+                <a16:creationId xmlns:a16="http://schemas.microsoft.com/office/drawing/2014/main" id="{45B53B61-64C3-6CF1-C7B7-04EA0D82DD1D}"/>
+              </a:ext>
+            </a:extLst>
+          </p:cNvPr>
+          <p:cNvGrpSpPr/>
+          <p:nvPr/>
+        </p:nvGrpSpPr>
+        <p:grpSpPr>
+          <a:xfrm>
+            <a:off x="6169152" y="270357"/>
+            <a:ext cx="5946648" cy="2808924"/>
+            <a:chOff x="624078" y="270357"/>
+            <a:chExt cx="5869258" cy="2808924"/>
+          </a:xfrm>
+        </p:grpSpPr>
+        <p:sp>
+          <p:nvSpPr>
+            <p:cNvPr id="8" name="TextBox 7">
+              <a:extLst>
+                <a:ext uri="{FF2B5EF4-FFF2-40B4-BE49-F238E27FC236}">
+                  <a16:creationId xmlns:a16="http://schemas.microsoft.com/office/drawing/2014/main" id="{1BA4D673-2AFB-8626-2E84-D6A4F1C1E624}"/>
+                </a:ext>
+              </a:extLst>
+            </p:cNvPr>
+            <p:cNvSpPr txBox="1"/>
+            <p:nvPr/>
+          </p:nvSpPr>
+          <p:spPr>
+            <a:xfrm>
+              <a:off x="624078" y="1369582"/>
+              <a:ext cx="5869258" cy="1709699"/>
+            </a:xfrm>
+            <a:prstGeom prst="rect">
+              <a:avLst/>
+            </a:prstGeom>
+            <a:noFill/>
+          </p:spPr>
+          <p:txBody>
+            <a:bodyPr wrap="square">
+              <a:spAutoFit/>
+            </a:bodyPr>
+            <a:lstStyle/>
+            <a:p>
+              <a:pPr>
+                <a:lnSpc>
+                  <a:spcPct val="150000"/>
+                </a:lnSpc>
+              </a:pPr>
+              <a:r>
+                <a:rPr lang="en-GB" dirty="0">
+                  <a:latin typeface="Fira Sans" panose="020B0503050000020004" pitchFamily="34" charset="0"/>
+                </a:rPr>
+                <a:t>Today you learned:</a:t>
+              </a:r>
+            </a:p>
+            <a:p>
+              <a:pPr>
+                <a:lnSpc>
+                  <a:spcPct val="150000"/>
+                </a:lnSpc>
+              </a:pPr>
+              <a:r>
+                <a:rPr lang="en-GB" dirty="0">
+                  <a:latin typeface="Fira Sans" panose="020B0503050000020004" pitchFamily="34" charset="0"/>
+                </a:rPr>
+                <a:t>✓ </a:t>
+              </a:r>
+              <a:r>
+                <a:rPr lang="en-US" dirty="0">
+                  <a:latin typeface="Fira Sans" panose="020B0503050000020004" pitchFamily="34" charset="0"/>
+                </a:rPr>
+                <a:t>Apply full workflow to real or internal dataset</a:t>
+              </a:r>
+            </a:p>
+            <a:p>
+              <a:pPr>
+                <a:lnSpc>
+                  <a:spcPct val="150000"/>
+                </a:lnSpc>
+              </a:pPr>
+              <a:r>
+                <a:rPr lang="en-GB" dirty="0">
+                  <a:latin typeface="Fira Sans" panose="020B0503050000020004" pitchFamily="34" charset="0"/>
+                </a:rPr>
+                <a:t>✓ </a:t>
+              </a:r>
+              <a:r>
+                <a:rPr lang="en-US" dirty="0">
+                  <a:latin typeface="Fira Sans" panose="020B0503050000020004" pitchFamily="34" charset="0"/>
+                </a:rPr>
+                <a:t>Interpret results in biological context</a:t>
+              </a:r>
+            </a:p>
+            <a:p>
+              <a:pPr>
+                <a:lnSpc>
+                  <a:spcPct val="150000"/>
+                </a:lnSpc>
+              </a:pPr>
+              <a:r>
+                <a:rPr lang="en-GB" dirty="0">
+                  <a:latin typeface="Fira Sans" panose="020B0503050000020004" pitchFamily="34" charset="0"/>
+                </a:rPr>
+                <a:t>✓ </a:t>
+              </a:r>
+              <a:r>
+                <a:rPr lang="en-US" dirty="0">
+                  <a:latin typeface="Fira Sans" panose="020B0503050000020004" pitchFamily="34" charset="0"/>
+                </a:rPr>
+                <a:t>Troubleshoot and discuss</a:t>
+              </a:r>
+            </a:p>
+          </p:txBody>
+        </p:sp>
+        <p:sp>
+          <p:nvSpPr>
+            <p:cNvPr id="9" name="TextBox 8">
+              <a:extLst>
+                <a:ext uri="{FF2B5EF4-FFF2-40B4-BE49-F238E27FC236}">
+                  <a16:creationId xmlns:a16="http://schemas.microsoft.com/office/drawing/2014/main" id="{70FB6393-4146-87E5-C61E-159BF2FED89A}"/>
+                </a:ext>
+              </a:extLst>
+            </p:cNvPr>
+            <p:cNvSpPr txBox="1"/>
+            <p:nvPr/>
+          </p:nvSpPr>
+          <p:spPr>
+            <a:xfrm>
+              <a:off x="624078" y="270357"/>
+              <a:ext cx="5154930" cy="672235"/>
+            </a:xfrm>
+            <a:prstGeom prst="rect">
+              <a:avLst/>
+            </a:prstGeom>
+            <a:noFill/>
+          </p:spPr>
+          <p:txBody>
+            <a:bodyPr wrap="square">
+              <a:spAutoFit/>
+            </a:bodyPr>
+            <a:lstStyle/>
+            <a:p>
+              <a:pPr algn="l">
+                <a:lnSpc>
+                  <a:spcPct val="150000"/>
+                </a:lnSpc>
+                <a:buNone/>
+              </a:pPr>
+              <a:r>
+                <a:rPr lang="en-US" sz="2800" b="0" i="0" dirty="0">
+                  <a:solidFill>
+                    <a:srgbClr val="1A292C"/>
+                  </a:solidFill>
+                  <a:effectLst/>
+                  <a:latin typeface="Fira Sans" panose="020B0503050000020004" pitchFamily="34" charset="0"/>
+                </a:rPr>
+                <a:t>Day </a:t>
+              </a:r>
+              <a:r>
+                <a:rPr lang="en-US" sz="2800" dirty="0">
+                  <a:solidFill>
+                    <a:srgbClr val="1A292C"/>
+                  </a:solidFill>
+                  <a:latin typeface="Fira Sans" panose="020B0503050000020004" pitchFamily="34" charset="0"/>
+                </a:rPr>
+                <a:t>5</a:t>
+              </a:r>
+              <a:r>
+                <a:rPr lang="en-US" sz="2800" b="0" i="0" dirty="0">
+                  <a:solidFill>
+                    <a:srgbClr val="1A292C"/>
+                  </a:solidFill>
+                  <a:effectLst/>
+                  <a:latin typeface="Fira Sans" panose="020B0503050000020004" pitchFamily="34" charset="0"/>
+                </a:rPr>
+                <a:t> Summary</a:t>
+              </a:r>
+            </a:p>
+          </p:txBody>
+        </p:sp>
+      </p:grpSp>
     </p:spTree>
     <p:extLst>
       <p:ext uri="{BB962C8B-B14F-4D97-AF65-F5344CB8AC3E}">
-        <p14:creationId xmlns:p14="http://schemas.microsoft.com/office/powerpoint/2010/main" val="3071097272"/>
+        <p14:creationId xmlns:p14="http://schemas.microsoft.com/office/powerpoint/2010/main" val="1977686079"/>
       </p:ext>
     </p:extLst>
   </p:cSld>

</xml_diff>

<commit_message>
add example dataset .xslx
</commit_message>
<xml_diff>
--- a/inst/r4proteomics_slides.pptx
+++ b/inst/r4proteomics_slides.pptx
@@ -6739,7 +6739,7 @@
           <a:p>
             <a:pPr algn="ctr"/>
             <a:endParaRPr lang="en-GB" dirty="0">
-              <a:latin typeface="Arial" panose="020B0604020202020204" pitchFamily="34" charset="0"/>
+              <a:latin typeface="Fira Sans" panose="020B0503050000020004" pitchFamily="34" charset="0"/>
               <a:cs typeface="Arial" panose="020B0604020202020204" pitchFamily="34" charset="0"/>
             </a:endParaRPr>
           </a:p>
@@ -6915,7 +6915,7 @@
               <a:p>
                 <a:pPr algn="ctr"/>
                 <a:endParaRPr lang="en-GB" sz="1600">
-                  <a:latin typeface="Arial" panose="020B0604020202020204" pitchFamily="34" charset="0"/>
+                  <a:latin typeface="Fira Sans" panose="020B0503050000020004" pitchFamily="34" charset="0"/>
                   <a:cs typeface="Arial" panose="020B0604020202020204" pitchFamily="34" charset="0"/>
                 </a:endParaRPr>
               </a:p>
@@ -6967,7 +6967,7 @@
               <a:p>
                 <a:pPr algn="ctr"/>
                 <a:endParaRPr lang="en-GB" sz="1600" dirty="0">
-                  <a:latin typeface="Arial" panose="020B0604020202020204" pitchFamily="34" charset="0"/>
+                  <a:latin typeface="Fira Sans" panose="020B0503050000020004" pitchFamily="34" charset="0"/>
                   <a:cs typeface="Arial" panose="020B0604020202020204" pitchFamily="34" charset="0"/>
                 </a:endParaRPr>
               </a:p>
@@ -7024,7 +7024,7 @@
                   <a:solidFill>
                     <a:schemeClr val="tx1"/>
                   </a:solidFill>
-                  <a:latin typeface="Arial" panose="020B0604020202020204" pitchFamily="34" charset="0"/>
+                  <a:latin typeface="Fira Sans" panose="020B0503050000020004" pitchFamily="34" charset="0"/>
                   <a:cs typeface="Arial" panose="020B0604020202020204" pitchFamily="34" charset="0"/>
                 </a:rPr>
                 <a:t>Day Course 1</a:t>
@@ -7033,7 +7033,7 @@
                 <a:solidFill>
                   <a:schemeClr val="tx1"/>
                 </a:solidFill>
-                <a:latin typeface="Arial" panose="020B0604020202020204" pitchFamily="34" charset="0"/>
+                <a:latin typeface="Fira Sans" panose="020B0503050000020004" pitchFamily="34" charset="0"/>
                 <a:cs typeface="Arial" panose="020B0604020202020204" pitchFamily="34" charset="0"/>
               </a:endParaRPr>
             </a:p>
@@ -7072,7 +7072,7 @@
                   <a:solidFill>
                     <a:schemeClr val="bg1"/>
                   </a:solidFill>
-                  <a:latin typeface="Arial" panose="020B0604020202020204" pitchFamily="34" charset="0"/>
+                  <a:latin typeface="Fira Sans" panose="020B0503050000020004" pitchFamily="34" charset="0"/>
                   <a:cs typeface="Arial" panose="020B0604020202020204" pitchFamily="34" charset="0"/>
                 </a:rPr>
                 <a:t>Introduction to R and RStudio</a:t>
@@ -7081,7 +7081,7 @@
                 <a:solidFill>
                   <a:schemeClr val="bg1"/>
                 </a:solidFill>
-                <a:latin typeface="Arial" panose="020B0604020202020204" pitchFamily="34" charset="0"/>
+                <a:latin typeface="Fira Sans" panose="020B0503050000020004" pitchFamily="34" charset="0"/>
                 <a:cs typeface="Arial" panose="020B0604020202020204" pitchFamily="34" charset="0"/>
               </a:endParaRPr>
             </a:p>
@@ -7169,7 +7169,7 @@
               <a:p>
                 <a:pPr algn="ctr"/>
                 <a:endParaRPr lang="en-GB" sz="1600">
-                  <a:latin typeface="Arial" panose="020B0604020202020204" pitchFamily="34" charset="0"/>
+                  <a:latin typeface="Fira Sans" panose="020B0503050000020004" pitchFamily="34" charset="0"/>
                   <a:cs typeface="Arial" panose="020B0604020202020204" pitchFamily="34" charset="0"/>
                 </a:endParaRPr>
               </a:p>
@@ -7221,7 +7221,7 @@
               <a:p>
                 <a:pPr algn="ctr"/>
                 <a:endParaRPr lang="en-GB" sz="1600" dirty="0">
-                  <a:latin typeface="Arial" panose="020B0604020202020204" pitchFamily="34" charset="0"/>
+                  <a:latin typeface="Fira Sans" panose="020B0503050000020004" pitchFamily="34" charset="0"/>
                   <a:cs typeface="Arial" panose="020B0604020202020204" pitchFamily="34" charset="0"/>
                 </a:endParaRPr>
               </a:p>
@@ -7278,7 +7278,7 @@
                   <a:solidFill>
                     <a:schemeClr val="tx1"/>
                   </a:solidFill>
-                  <a:latin typeface="Arial" panose="020B0604020202020204" pitchFamily="34" charset="0"/>
+                  <a:latin typeface="Fira Sans" panose="020B0503050000020004" pitchFamily="34" charset="0"/>
                   <a:cs typeface="Arial" panose="020B0604020202020204" pitchFamily="34" charset="0"/>
                 </a:rPr>
                 <a:t>Day Course 2</a:t>
@@ -7287,7 +7287,7 @@
                 <a:solidFill>
                   <a:schemeClr val="tx1"/>
                 </a:solidFill>
-                <a:latin typeface="Arial" panose="020B0604020202020204" pitchFamily="34" charset="0"/>
+                <a:latin typeface="Fira Sans" panose="020B0503050000020004" pitchFamily="34" charset="0"/>
                 <a:cs typeface="Arial" panose="020B0604020202020204" pitchFamily="34" charset="0"/>
               </a:endParaRPr>
             </a:p>
@@ -7326,7 +7326,7 @@
                   <a:solidFill>
                     <a:schemeClr val="bg1"/>
                   </a:solidFill>
-                  <a:latin typeface="Arial" panose="020B0604020202020204" pitchFamily="34" charset="0"/>
+                  <a:latin typeface="Fira Sans" panose="020B0503050000020004" pitchFamily="34" charset="0"/>
                   <a:cs typeface="Arial" panose="020B0604020202020204" pitchFamily="34" charset="0"/>
                 </a:rPr>
                 <a:t>Applying Statistics  and Core Data science Techniques in Proteomics</a:t>
@@ -7335,7 +7335,7 @@
                 <a:solidFill>
                   <a:schemeClr val="bg1"/>
                 </a:solidFill>
-                <a:latin typeface="Arial" panose="020B0604020202020204" pitchFamily="34" charset="0"/>
+                <a:latin typeface="Fira Sans" panose="020B0503050000020004" pitchFamily="34" charset="0"/>
                 <a:cs typeface="Arial" panose="020B0604020202020204" pitchFamily="34" charset="0"/>
               </a:endParaRPr>
             </a:p>
@@ -7423,7 +7423,7 @@
               <a:p>
                 <a:pPr algn="ctr"/>
                 <a:endParaRPr lang="en-GB" sz="1600">
-                  <a:latin typeface="Arial" panose="020B0604020202020204" pitchFamily="34" charset="0"/>
+                  <a:latin typeface="Fira Sans" panose="020B0503050000020004" pitchFamily="34" charset="0"/>
                   <a:cs typeface="Arial" panose="020B0604020202020204" pitchFamily="34" charset="0"/>
                 </a:endParaRPr>
               </a:p>
@@ -7475,7 +7475,7 @@
               <a:p>
                 <a:pPr algn="ctr"/>
                 <a:endParaRPr lang="en-GB" sz="1600" dirty="0">
-                  <a:latin typeface="Arial" panose="020B0604020202020204" pitchFamily="34" charset="0"/>
+                  <a:latin typeface="Fira Sans" panose="020B0503050000020004" pitchFamily="34" charset="0"/>
                   <a:cs typeface="Arial" panose="020B0604020202020204" pitchFamily="34" charset="0"/>
                 </a:endParaRPr>
               </a:p>
@@ -7532,7 +7532,7 @@
                   <a:solidFill>
                     <a:schemeClr val="tx1"/>
                   </a:solidFill>
-                  <a:latin typeface="Arial" panose="020B0604020202020204" pitchFamily="34" charset="0"/>
+                  <a:latin typeface="Fira Sans" panose="020B0503050000020004" pitchFamily="34" charset="0"/>
                   <a:cs typeface="Arial" panose="020B0604020202020204" pitchFamily="34" charset="0"/>
                 </a:rPr>
                 <a:t>Day Course 3</a:t>
@@ -7541,7 +7541,7 @@
                 <a:solidFill>
                   <a:schemeClr val="tx1"/>
                 </a:solidFill>
-                <a:latin typeface="Arial" panose="020B0604020202020204" pitchFamily="34" charset="0"/>
+                <a:latin typeface="Fira Sans" panose="020B0503050000020004" pitchFamily="34" charset="0"/>
                 <a:cs typeface="Arial" panose="020B0604020202020204" pitchFamily="34" charset="0"/>
               </a:endParaRPr>
             </a:p>
@@ -7580,7 +7580,7 @@
                   <a:solidFill>
                     <a:schemeClr val="bg1"/>
                   </a:solidFill>
-                  <a:latin typeface="Arial" panose="020B0604020202020204" pitchFamily="34" charset="0"/>
+                  <a:latin typeface="Fira Sans" panose="020B0503050000020004" pitchFamily="34" charset="0"/>
                   <a:cs typeface="Arial" panose="020B0604020202020204" pitchFamily="34" charset="0"/>
                 </a:rPr>
                 <a:t>Quality Control, Preprocessing and Differential Expression</a:t>
@@ -7589,7 +7589,7 @@
                 <a:solidFill>
                   <a:schemeClr val="bg1"/>
                 </a:solidFill>
-                <a:latin typeface="Arial" panose="020B0604020202020204" pitchFamily="34" charset="0"/>
+                <a:latin typeface="Fira Sans" panose="020B0503050000020004" pitchFamily="34" charset="0"/>
                 <a:cs typeface="Arial" panose="020B0604020202020204" pitchFamily="34" charset="0"/>
               </a:endParaRPr>
             </a:p>
@@ -7677,7 +7677,7 @@
               <a:p>
                 <a:pPr algn="ctr"/>
                 <a:endParaRPr lang="en-GB" sz="1600">
-                  <a:latin typeface="Arial" panose="020B0604020202020204" pitchFamily="34" charset="0"/>
+                  <a:latin typeface="Fira Sans" panose="020B0503050000020004" pitchFamily="34" charset="0"/>
                   <a:cs typeface="Arial" panose="020B0604020202020204" pitchFamily="34" charset="0"/>
                 </a:endParaRPr>
               </a:p>
@@ -7729,7 +7729,7 @@
               <a:p>
                 <a:pPr algn="ctr"/>
                 <a:endParaRPr lang="en-GB" sz="1600" dirty="0">
-                  <a:latin typeface="Arial" panose="020B0604020202020204" pitchFamily="34" charset="0"/>
+                  <a:latin typeface="Fira Sans" panose="020B0503050000020004" pitchFamily="34" charset="0"/>
                   <a:cs typeface="Arial" panose="020B0604020202020204" pitchFamily="34" charset="0"/>
                 </a:endParaRPr>
               </a:p>
@@ -7786,7 +7786,7 @@
                   <a:solidFill>
                     <a:schemeClr val="tx1"/>
                   </a:solidFill>
-                  <a:latin typeface="Arial" panose="020B0604020202020204" pitchFamily="34" charset="0"/>
+                  <a:latin typeface="Fira Sans" panose="020B0503050000020004" pitchFamily="34" charset="0"/>
                   <a:cs typeface="Arial" panose="020B0604020202020204" pitchFamily="34" charset="0"/>
                 </a:rPr>
                 <a:t>Day Course 4</a:t>
@@ -7795,7 +7795,7 @@
                 <a:solidFill>
                   <a:schemeClr val="tx1"/>
                 </a:solidFill>
-                <a:latin typeface="Arial" panose="020B0604020202020204" pitchFamily="34" charset="0"/>
+                <a:latin typeface="Fira Sans" panose="020B0503050000020004" pitchFamily="34" charset="0"/>
                 <a:cs typeface="Arial" panose="020B0604020202020204" pitchFamily="34" charset="0"/>
               </a:endParaRPr>
             </a:p>
@@ -7834,7 +7834,7 @@
                   <a:solidFill>
                     <a:schemeClr val="bg1"/>
                   </a:solidFill>
-                  <a:latin typeface="Arial" panose="020B0604020202020204" pitchFamily="34" charset="0"/>
+                  <a:latin typeface="Fira Sans" panose="020B0503050000020004" pitchFamily="34" charset="0"/>
                   <a:cs typeface="Arial" panose="020B0604020202020204" pitchFamily="34" charset="0"/>
                 </a:rPr>
                 <a:t>Functional Analysis, Longitudinal &amp; Public Data</a:t>
@@ -7843,7 +7843,7 @@
                 <a:solidFill>
                   <a:schemeClr val="bg1"/>
                 </a:solidFill>
-                <a:latin typeface="Arial" panose="020B0604020202020204" pitchFamily="34" charset="0"/>
+                <a:latin typeface="Fira Sans" panose="020B0503050000020004" pitchFamily="34" charset="0"/>
                 <a:cs typeface="Arial" panose="020B0604020202020204" pitchFamily="34" charset="0"/>
               </a:endParaRPr>
             </a:p>
@@ -7931,7 +7931,7 @@
               <a:p>
                 <a:pPr algn="ctr"/>
                 <a:endParaRPr lang="en-GB" sz="1600">
-                  <a:latin typeface="Arial" panose="020B0604020202020204" pitchFamily="34" charset="0"/>
+                  <a:latin typeface="Fira Sans" panose="020B0503050000020004" pitchFamily="34" charset="0"/>
                   <a:cs typeface="Arial" panose="020B0604020202020204" pitchFamily="34" charset="0"/>
                 </a:endParaRPr>
               </a:p>
@@ -7983,7 +7983,7 @@
               <a:p>
                 <a:pPr algn="ctr"/>
                 <a:endParaRPr lang="en-GB" sz="1600" dirty="0">
-                  <a:latin typeface="Arial" panose="020B0604020202020204" pitchFamily="34" charset="0"/>
+                  <a:latin typeface="Fira Sans" panose="020B0503050000020004" pitchFamily="34" charset="0"/>
                   <a:cs typeface="Arial" panose="020B0604020202020204" pitchFamily="34" charset="0"/>
                 </a:endParaRPr>
               </a:p>
@@ -8040,7 +8040,7 @@
                   <a:solidFill>
                     <a:schemeClr val="tx1"/>
                   </a:solidFill>
-                  <a:latin typeface="Arial" panose="020B0604020202020204" pitchFamily="34" charset="0"/>
+                  <a:latin typeface="Fira Sans" panose="020B0503050000020004" pitchFamily="34" charset="0"/>
                   <a:cs typeface="Arial" panose="020B0604020202020204" pitchFamily="34" charset="0"/>
                 </a:rPr>
                 <a:t>Day Course 5</a:t>
@@ -8049,7 +8049,7 @@
                 <a:solidFill>
                   <a:schemeClr val="tx1"/>
                 </a:solidFill>
-                <a:latin typeface="Arial" panose="020B0604020202020204" pitchFamily="34" charset="0"/>
+                <a:latin typeface="Fira Sans" panose="020B0503050000020004" pitchFamily="34" charset="0"/>
                 <a:cs typeface="Arial" panose="020B0604020202020204" pitchFamily="34" charset="0"/>
               </a:endParaRPr>
             </a:p>
@@ -8088,7 +8088,7 @@
                   <a:solidFill>
                     <a:schemeClr val="bg1"/>
                   </a:solidFill>
-                  <a:latin typeface="Arial" panose="020B0604020202020204" pitchFamily="34" charset="0"/>
+                  <a:latin typeface="Fira Sans" panose="020B0503050000020004" pitchFamily="34" charset="0"/>
                   <a:cs typeface="Arial" panose="020B0604020202020204" pitchFamily="34" charset="0"/>
                 </a:rPr>
                 <a:t>Application on Real Data, Advanced techniques, solving problems with supervised learning + Exploring future direction of proteomics</a:t>
@@ -8097,7 +8097,7 @@
                 <a:solidFill>
                   <a:schemeClr val="bg1"/>
                 </a:solidFill>
-                <a:latin typeface="Arial" panose="020B0604020202020204" pitchFamily="34" charset="0"/>
+                <a:latin typeface="Fira Sans" panose="020B0503050000020004" pitchFamily="34" charset="0"/>
                 <a:cs typeface="Arial" panose="020B0604020202020204" pitchFamily="34" charset="0"/>
               </a:endParaRPr>
             </a:p>
@@ -8134,27 +8134,27 @@
           <a:p>
             <a:r>
               <a:rPr lang="en-US" dirty="0">
-                <a:latin typeface="Arial" panose="020B0604020202020204" pitchFamily="34" charset="0"/>
+                <a:latin typeface="Fira Sans" panose="020B0503050000020004" pitchFamily="34" charset="0"/>
                 <a:cs typeface="Arial" panose="020B0604020202020204" pitchFamily="34" charset="0"/>
               </a:rPr>
               <a:t>In-person: </a:t>
             </a:r>
             <a:r>
               <a:rPr lang="en-US" i="1" dirty="0">
-                <a:latin typeface="Arial" panose="020B0604020202020204" pitchFamily="34" charset="0"/>
+                <a:latin typeface="Fira Sans" panose="020B0503050000020004" pitchFamily="34" charset="0"/>
                 <a:cs typeface="Arial" panose="020B0604020202020204" pitchFamily="34" charset="0"/>
               </a:rPr>
               <a:t>r4proteomics</a:t>
             </a:r>
             <a:r>
               <a:rPr lang="en-US" dirty="0">
-                <a:latin typeface="Arial" panose="020B0604020202020204" pitchFamily="34" charset="0"/>
+                <a:latin typeface="Fira Sans" panose="020B0503050000020004" pitchFamily="34" charset="0"/>
                 <a:cs typeface="Arial" panose="020B0604020202020204" pitchFamily="34" charset="0"/>
               </a:rPr>
               <a:t> training</a:t>
             </a:r>
             <a:endParaRPr lang="en-GB" dirty="0">
-              <a:latin typeface="Arial" panose="020B0604020202020204" pitchFamily="34" charset="0"/>
+              <a:latin typeface="Fira Sans" panose="020B0503050000020004" pitchFamily="34" charset="0"/>
               <a:cs typeface="Arial" panose="020B0604020202020204" pitchFamily="34" charset="0"/>
             </a:endParaRPr>
           </a:p>
@@ -8190,41 +8190,41 @@
           <a:p>
             <a:r>
               <a:rPr lang="en-US" sz="2400" dirty="0">
-                <a:latin typeface="Arial" panose="020B0604020202020204" pitchFamily="34" charset="0"/>
+                <a:latin typeface="Fira Sans" panose="020B0503050000020004" pitchFamily="34" charset="0"/>
                 <a:cs typeface="Arial" panose="020B0604020202020204" pitchFamily="34" charset="0"/>
               </a:rPr>
               <a:t>A </a:t>
             </a:r>
             <a:r>
               <a:rPr lang="en-US" sz="2400" b="1" dirty="0">
-                <a:latin typeface="Arial" panose="020B0604020202020204" pitchFamily="34" charset="0"/>
+                <a:latin typeface="Fira Sans" panose="020B0503050000020004" pitchFamily="34" charset="0"/>
                 <a:cs typeface="Arial" panose="020B0604020202020204" pitchFamily="34" charset="0"/>
               </a:rPr>
               <a:t>5-day training</a:t>
             </a:r>
             <a:r>
               <a:rPr lang="en-US" sz="2400" dirty="0">
-                <a:latin typeface="Arial" panose="020B0604020202020204" pitchFamily="34" charset="0"/>
+                <a:latin typeface="Fira Sans" panose="020B0503050000020004" pitchFamily="34" charset="0"/>
                 <a:cs typeface="Arial" panose="020B0604020202020204" pitchFamily="34" charset="0"/>
               </a:rPr>
               <a:t> on proteomics data analysis using </a:t>
             </a:r>
             <a:r>
               <a:rPr lang="en-US" sz="2400" b="1" dirty="0">
-                <a:latin typeface="Arial" panose="020B0604020202020204" pitchFamily="34" charset="0"/>
+                <a:latin typeface="Fira Sans" panose="020B0503050000020004" pitchFamily="34" charset="0"/>
                 <a:cs typeface="Arial" panose="020B0604020202020204" pitchFamily="34" charset="0"/>
               </a:rPr>
               <a:t>R</a:t>
             </a:r>
             <a:r>
               <a:rPr lang="en-US" sz="2400" dirty="0">
-                <a:latin typeface="Arial" panose="020B0604020202020204" pitchFamily="34" charset="0"/>
+                <a:latin typeface="Fira Sans" panose="020B0503050000020004" pitchFamily="34" charset="0"/>
                 <a:cs typeface="Arial" panose="020B0604020202020204" pitchFamily="34" charset="0"/>
               </a:rPr>
               <a:t>.</a:t>
             </a:r>
             <a:endParaRPr lang="en-GB" sz="2400" dirty="0">
-              <a:latin typeface="Arial" panose="020B0604020202020204" pitchFamily="34" charset="0"/>
+              <a:latin typeface="Fira Sans" panose="020B0503050000020004" pitchFamily="34" charset="0"/>
               <a:cs typeface="Arial" panose="020B0604020202020204" pitchFamily="34" charset="0"/>
             </a:endParaRPr>
           </a:p>
@@ -8260,21 +8260,21 @@
           <a:p>
             <a:r>
               <a:rPr lang="en-US" sz="1600" dirty="0">
-                <a:latin typeface="Arial" panose="020B0604020202020204" pitchFamily="34" charset="0"/>
+                <a:latin typeface="Fira Sans" panose="020B0503050000020004" pitchFamily="34" charset="0"/>
                 <a:cs typeface="Arial" panose="020B0604020202020204" pitchFamily="34" charset="0"/>
               </a:rPr>
               <a:t>Supporting materials available on: </a:t>
             </a:r>
             <a:r>
               <a:rPr lang="en-GB" sz="1600" dirty="0">
-                <a:latin typeface="Arial" panose="020B0604020202020204" pitchFamily="34" charset="0"/>
+                <a:latin typeface="Fira Sans" panose="020B0503050000020004" pitchFamily="34" charset="0"/>
                 <a:cs typeface="Arial" panose="020B0604020202020204" pitchFamily="34" charset="0"/>
                 <a:hlinkClick r:id="rId2"/>
               </a:rPr>
               <a:t>Welcome | r4proteomics</a:t>
             </a:r>
             <a:endParaRPr lang="en-GB" sz="1600" dirty="0">
-              <a:latin typeface="Arial" panose="020B0604020202020204" pitchFamily="34" charset="0"/>
+              <a:latin typeface="Fira Sans" panose="020B0503050000020004" pitchFamily="34" charset="0"/>
               <a:cs typeface="Arial" panose="020B0604020202020204" pitchFamily="34" charset="0"/>
             </a:endParaRPr>
           </a:p>
@@ -8310,7 +8310,7 @@
           <a:p>
             <a:r>
               <a:rPr lang="en-GB" sz="1600" dirty="0">
-                <a:latin typeface="Arial" panose="020B0604020202020204" pitchFamily="34" charset="0"/>
+                <a:latin typeface="Fira Sans" panose="020B0503050000020004" pitchFamily="34" charset="0"/>
                 <a:cs typeface="Arial" panose="020B0604020202020204" pitchFamily="34" charset="0"/>
               </a:rPr>
               <a:t>written by: </a:t>
@@ -8319,14 +8319,14 @@
           <a:p>
             <a:r>
               <a:rPr lang="en-GB" sz="1600" b="1" dirty="0">
-                <a:latin typeface="Arial" panose="020B0604020202020204" pitchFamily="34" charset="0"/>
+                <a:latin typeface="Fira Sans" panose="020B0503050000020004" pitchFamily="34" charset="0"/>
                 <a:cs typeface="Arial" panose="020B0604020202020204" pitchFamily="34" charset="0"/>
               </a:rPr>
               <a:t>Miguel CASANOVA</a:t>
             </a:r>
             <a:r>
               <a:rPr lang="en-GB" sz="1600" dirty="0">
-                <a:latin typeface="Arial" panose="020B0604020202020204" pitchFamily="34" charset="0"/>
+                <a:latin typeface="Fira Sans" panose="020B0503050000020004" pitchFamily="34" charset="0"/>
                 <a:cs typeface="Arial" panose="020B0604020202020204" pitchFamily="34" charset="0"/>
               </a:rPr>
               <a:t>, PhD &amp; </a:t>
@@ -8335,7 +8335,7 @@
           <a:p>
             <a:r>
               <a:rPr lang="en-GB" sz="1600" b="1" dirty="0">
-                <a:latin typeface="Arial" panose="020B0604020202020204" pitchFamily="34" charset="0"/>
+                <a:latin typeface="Fira Sans" panose="020B0503050000020004" pitchFamily="34" charset="0"/>
                 <a:cs typeface="Arial" panose="020B0604020202020204" pitchFamily="34" charset="0"/>
               </a:rPr>
               <a:t>Dany MUKESHA</a:t>

</xml_diff>

<commit_message>
add some related DMD proteomics public datasets
</commit_message>
<xml_diff>
--- a/inst/r4proteomics_slides.pptx
+++ b/inst/r4proteomics_slides.pptx
@@ -265,7 +265,7 @@
           <a:p>
             <a:fld id="{8026D668-90A6-4547-97E8-9A0A42296A1B}" type="datetimeFigureOut">
               <a:rPr lang="en-GB" smtClean="0"/>
-              <a:t>23/10/2025</a:t>
+              <a:t>04/11/2025</a:t>
             </a:fld>
             <a:endParaRPr lang="en-GB"/>
           </a:p>
@@ -523,7 +523,7 @@
           <a:p>
             <a:fld id="{3B761CF2-C4C9-4DEE-8992-FAB361DB7BD4}" type="datetimeFigureOut">
               <a:rPr lang="en-GB" smtClean="0"/>
-              <a:t>23/10/2025</a:t>
+              <a:t>04/11/2025</a:t>
             </a:fld>
             <a:endParaRPr lang="en-GB"/>
           </a:p>
@@ -721,7 +721,7 @@
           <a:p>
             <a:fld id="{3B761CF2-C4C9-4DEE-8992-FAB361DB7BD4}" type="datetimeFigureOut">
               <a:rPr lang="en-GB" smtClean="0"/>
-              <a:t>23/10/2025</a:t>
+              <a:t>04/11/2025</a:t>
             </a:fld>
             <a:endParaRPr lang="en-GB"/>
           </a:p>
@@ -929,7 +929,7 @@
           <a:p>
             <a:fld id="{3B761CF2-C4C9-4DEE-8992-FAB361DB7BD4}" type="datetimeFigureOut">
               <a:rPr lang="en-GB" smtClean="0"/>
-              <a:t>23/10/2025</a:t>
+              <a:t>04/11/2025</a:t>
             </a:fld>
             <a:endParaRPr lang="en-GB"/>
           </a:p>
@@ -1133,7 +1133,7 @@
           <a:p>
             <a:fld id="{033ADCF0-A78D-4AB5-8D9E-D2EFF7703854}" type="datetimeFigureOut">
               <a:rPr lang="en-GB" smtClean="0"/>
-              <a:t>23/10/2025</a:t>
+              <a:t>04/11/2025</a:t>
             </a:fld>
             <a:endParaRPr lang="en-GB"/>
           </a:p>
@@ -1307,7 +1307,7 @@
           <a:p>
             <a:fld id="{033ADCF0-A78D-4AB5-8D9E-D2EFF7703854}" type="datetimeFigureOut">
               <a:rPr lang="en-GB" smtClean="0"/>
-              <a:t>23/10/2025</a:t>
+              <a:t>04/11/2025</a:t>
             </a:fld>
             <a:endParaRPr lang="en-GB"/>
           </a:p>
@@ -1557,7 +1557,7 @@
           <a:p>
             <a:fld id="{033ADCF0-A78D-4AB5-8D9E-D2EFF7703854}" type="datetimeFigureOut">
               <a:rPr lang="en-GB" smtClean="0"/>
-              <a:t>23/10/2025</a:t>
+              <a:t>04/11/2025</a:t>
             </a:fld>
             <a:endParaRPr lang="en-GB"/>
           </a:p>
@@ -1793,7 +1793,7 @@
           <a:p>
             <a:fld id="{033ADCF0-A78D-4AB5-8D9E-D2EFF7703854}" type="datetimeFigureOut">
               <a:rPr lang="en-GB" smtClean="0"/>
-              <a:t>23/10/2025</a:t>
+              <a:t>04/11/2025</a:t>
             </a:fld>
             <a:endParaRPr lang="en-GB"/>
           </a:p>
@@ -2164,7 +2164,7 @@
           <a:p>
             <a:fld id="{033ADCF0-A78D-4AB5-8D9E-D2EFF7703854}" type="datetimeFigureOut">
               <a:rPr lang="en-GB" smtClean="0"/>
-              <a:t>23/10/2025</a:t>
+              <a:t>04/11/2025</a:t>
             </a:fld>
             <a:endParaRPr lang="en-GB"/>
           </a:p>
@@ -2286,7 +2286,7 @@
           <a:p>
             <a:fld id="{033ADCF0-A78D-4AB5-8D9E-D2EFF7703854}" type="datetimeFigureOut">
               <a:rPr lang="en-GB" smtClean="0"/>
-              <a:t>23/10/2025</a:t>
+              <a:t>04/11/2025</a:t>
             </a:fld>
             <a:endParaRPr lang="en-GB"/>
           </a:p>
@@ -2385,7 +2385,7 @@
           <a:p>
             <a:fld id="{033ADCF0-A78D-4AB5-8D9E-D2EFF7703854}" type="datetimeFigureOut">
               <a:rPr lang="en-GB" smtClean="0"/>
-              <a:t>23/10/2025</a:t>
+              <a:t>04/11/2025</a:t>
             </a:fld>
             <a:endParaRPr lang="en-GB"/>
           </a:p>
@@ -2682,7 +2682,7 @@
           <a:p>
             <a:fld id="{033ADCF0-A78D-4AB5-8D9E-D2EFF7703854}" type="datetimeFigureOut">
               <a:rPr lang="en-GB" smtClean="0"/>
-              <a:t>23/10/2025</a:t>
+              <a:t>04/11/2025</a:t>
             </a:fld>
             <a:endParaRPr lang="en-GB"/>
           </a:p>
@@ -2888,7 +2888,7 @@
           <a:p>
             <a:fld id="{3B761CF2-C4C9-4DEE-8992-FAB361DB7BD4}" type="datetimeFigureOut">
               <a:rPr lang="en-GB" smtClean="0"/>
-              <a:t>23/10/2025</a:t>
+              <a:t>04/11/2025</a:t>
             </a:fld>
             <a:endParaRPr lang="en-GB"/>
           </a:p>
@@ -3157,7 +3157,7 @@
           <a:p>
             <a:fld id="{033ADCF0-A78D-4AB5-8D9E-D2EFF7703854}" type="datetimeFigureOut">
               <a:rPr lang="en-GB" smtClean="0"/>
-              <a:t>23/10/2025</a:t>
+              <a:t>04/11/2025</a:t>
             </a:fld>
             <a:endParaRPr lang="en-GB"/>
           </a:p>
@@ -3347,7 +3347,7 @@
           <a:p>
             <a:fld id="{033ADCF0-A78D-4AB5-8D9E-D2EFF7703854}" type="datetimeFigureOut">
               <a:rPr lang="en-GB" smtClean="0"/>
-              <a:t>23/10/2025</a:t>
+              <a:t>04/11/2025</a:t>
             </a:fld>
             <a:endParaRPr lang="en-GB"/>
           </a:p>
@@ -3527,7 +3527,7 @@
           <a:p>
             <a:fld id="{033ADCF0-A78D-4AB5-8D9E-D2EFF7703854}" type="datetimeFigureOut">
               <a:rPr lang="en-GB" smtClean="0"/>
-              <a:t>23/10/2025</a:t>
+              <a:t>04/11/2025</a:t>
             </a:fld>
             <a:endParaRPr lang="en-GB"/>
           </a:p>
@@ -3656,7 +3656,7 @@
           <a:p>
             <a:fld id="{033ADCF0-A78D-4AB5-8D9E-D2EFF7703854}" type="datetimeFigureOut">
               <a:rPr lang="en-GB" smtClean="0"/>
-              <a:t>23/10/2025</a:t>
+              <a:t>04/11/2025</a:t>
             </a:fld>
             <a:endParaRPr lang="en-GB"/>
           </a:p>
@@ -3935,7 +3935,7 @@
           <a:p>
             <a:fld id="{3B761CF2-C4C9-4DEE-8992-FAB361DB7BD4}" type="datetimeFigureOut">
               <a:rPr lang="en-GB" smtClean="0"/>
-              <a:t>23/10/2025</a:t>
+              <a:t>04/11/2025</a:t>
             </a:fld>
             <a:endParaRPr lang="en-GB"/>
           </a:p>
@@ -4200,7 +4200,7 @@
           <a:p>
             <a:fld id="{3B761CF2-C4C9-4DEE-8992-FAB361DB7BD4}" type="datetimeFigureOut">
               <a:rPr lang="en-GB" smtClean="0"/>
-              <a:t>23/10/2025</a:t>
+              <a:t>04/11/2025</a:t>
             </a:fld>
             <a:endParaRPr lang="en-GB"/>
           </a:p>
@@ -4612,7 +4612,7 @@
           <a:p>
             <a:fld id="{3B761CF2-C4C9-4DEE-8992-FAB361DB7BD4}" type="datetimeFigureOut">
               <a:rPr lang="en-GB" smtClean="0"/>
-              <a:t>23/10/2025</a:t>
+              <a:t>04/11/2025</a:t>
             </a:fld>
             <a:endParaRPr lang="en-GB"/>
           </a:p>
@@ -4753,7 +4753,7 @@
           <a:p>
             <a:fld id="{3B761CF2-C4C9-4DEE-8992-FAB361DB7BD4}" type="datetimeFigureOut">
               <a:rPr lang="en-GB" smtClean="0"/>
-              <a:t>23/10/2025</a:t>
+              <a:t>04/11/2025</a:t>
             </a:fld>
             <a:endParaRPr lang="en-GB"/>
           </a:p>
@@ -4866,7 +4866,7 @@
           <a:p>
             <a:fld id="{3B761CF2-C4C9-4DEE-8992-FAB361DB7BD4}" type="datetimeFigureOut">
               <a:rPr lang="en-GB" smtClean="0"/>
-              <a:t>23/10/2025</a:t>
+              <a:t>04/11/2025</a:t>
             </a:fld>
             <a:endParaRPr lang="en-GB"/>
           </a:p>
@@ -5177,7 +5177,7 @@
           <a:p>
             <a:fld id="{3B761CF2-C4C9-4DEE-8992-FAB361DB7BD4}" type="datetimeFigureOut">
               <a:rPr lang="en-GB" smtClean="0"/>
-              <a:t>23/10/2025</a:t>
+              <a:t>04/11/2025</a:t>
             </a:fld>
             <a:endParaRPr lang="en-GB"/>
           </a:p>
@@ -5465,7 +5465,7 @@
           <a:p>
             <a:fld id="{3B761CF2-C4C9-4DEE-8992-FAB361DB7BD4}" type="datetimeFigureOut">
               <a:rPr lang="en-GB" smtClean="0"/>
-              <a:t>23/10/2025</a:t>
+              <a:t>04/11/2025</a:t>
             </a:fld>
             <a:endParaRPr lang="en-GB"/>
           </a:p>
@@ -5706,7 +5706,7 @@
           <a:p>
             <a:fld id="{3B761CF2-C4C9-4DEE-8992-FAB361DB7BD4}" type="datetimeFigureOut">
               <a:rPr lang="en-GB" smtClean="0"/>
-              <a:t>23/10/2025</a:t>
+              <a:t>04/11/2025</a:t>
             </a:fld>
             <a:endParaRPr lang="en-GB"/>
           </a:p>
@@ -6274,7 +6274,7 @@
           <a:p>
             <a:fld id="{3B761CF2-C4C9-4DEE-8992-FAB361DB7BD4}" type="datetimeFigureOut">
               <a:rPr lang="en-GB" smtClean="0"/>
-              <a:t>23/10/2025</a:t>
+              <a:t>04/11/2025</a:t>
             </a:fld>
             <a:endParaRPr lang="en-GB"/>
           </a:p>
@@ -9060,7 +9060,7 @@
                   <a:effectLst/>
                   <a:latin typeface="Fira Sans" panose="020B0503050000020004" pitchFamily="34" charset="0"/>
                 </a:rPr>
-                <a:t>Advantages:</a:t>
+                <a:t>Agendas:</a:t>
               </a:r>
               <a:endParaRPr lang="en-US" b="0" i="0" dirty="0">
                 <a:solidFill>
@@ -9265,7 +9265,7 @@
                 <a:rPr lang="en-GB" dirty="0">
                   <a:latin typeface="Fira Sans" panose="020B0503050000020004" pitchFamily="34" charset="0"/>
                 </a:rPr>
-                <a:t>Today you learned:</a:t>
+                <a:t>Today you will learn:</a:t>
               </a:r>
             </a:p>
             <a:p>
@@ -9745,7 +9745,7 @@
                 <a:rPr lang="en-GB" dirty="0">
                   <a:latin typeface="Fira Sans" panose="020B0503050000020004" pitchFamily="34" charset="0"/>
                 </a:rPr>
-                <a:t>Today you learned:</a:t>
+                <a:t>Today you will learn:</a:t>
               </a:r>
             </a:p>
             <a:p>
@@ -10904,7 +10904,7 @@
               </a:r>
             </a:p>
             <a:p>
-              <a:pPr marL="285750" indent="-285750" algn="l">
+              <a:pPr marL="285750" indent="-182880" algn="l">
                 <a:lnSpc>
                   <a:spcPct val="150000"/>
                 </a:lnSpc>
@@ -10961,7 +10961,7 @@
               </a:r>
             </a:p>
             <a:p>
-              <a:pPr marL="285750" indent="-285750" algn="l">
+              <a:pPr marL="285750" indent="-182880" algn="l">
                 <a:lnSpc>
                   <a:spcPct val="150000"/>
                 </a:lnSpc>
@@ -10999,7 +10999,7 @@
               </a:r>
             </a:p>
             <a:p>
-              <a:pPr marL="285750" indent="-285750" algn="l">
+              <a:pPr marL="285750" indent="-182880" algn="l">
                 <a:lnSpc>
                   <a:spcPct val="150000"/>
                 </a:lnSpc>

</xml_diff>